<commit_message>
Introduction to JUnit 5 presentation updates
</commit_message>
<xml_diff>
--- a/presentations/Introduction to JUnit 5.pptx
+++ b/presentations/Introduction to JUnit 5.pptx
@@ -12,7 +12,14 @@
     <p:sldId id="260" r:id="rId6"/>
     <p:sldId id="265" r:id="rId7"/>
     <p:sldId id="261" r:id="rId8"/>
-    <p:sldId id="264" r:id="rId9"/>
+    <p:sldId id="266" r:id="rId9"/>
+    <p:sldId id="267" r:id="rId10"/>
+    <p:sldId id="268" r:id="rId11"/>
+    <p:sldId id="269" r:id="rId12"/>
+    <p:sldId id="270" r:id="rId13"/>
+    <p:sldId id="271" r:id="rId14"/>
+    <p:sldId id="272" r:id="rId15"/>
+    <p:sldId id="264" r:id="rId16"/>
   </p:sldIdLst>
   <p:sldSz cx="12192000" cy="6858000"/>
   <p:notesSz cx="6858000" cy="9144000"/>
@@ -3402,6 +3409,811 @@
 </p:sld>
 </file>
 
+<file path=ppt/slides/slide10.xml><?xml version="1.0" encoding="utf-8"?>
+<p:sld xmlns:a="http://schemas.openxmlformats.org/drawingml/2006/main" xmlns:r="http://schemas.openxmlformats.org/officeDocument/2006/relationships" xmlns:p="http://schemas.openxmlformats.org/presentationml/2006/main">
+  <p:cSld>
+    <p:spTree>
+      <p:nvGrpSpPr>
+        <p:cNvPr id="1" name=""/>
+        <p:cNvGrpSpPr/>
+        <p:nvPr/>
+      </p:nvGrpSpPr>
+      <p:grpSpPr>
+        <a:xfrm>
+          <a:off x="0" y="0"/>
+          <a:ext cx="0" cy="0"/>
+          <a:chOff x="0" y="0"/>
+          <a:chExt cx="0" cy="0"/>
+        </a:xfrm>
+      </p:grpSpPr>
+      <p:sp>
+        <p:nvSpPr>
+          <p:cNvPr id="2" name="Title 1">
+            <a:extLst>
+              <a:ext uri="{FF2B5EF4-FFF2-40B4-BE49-F238E27FC236}">
+                <a16:creationId xmlns:a16="http://schemas.microsoft.com/office/drawing/2014/main" id="{88BE01EE-A1FB-9B42-9CE2-5B541743970F}"/>
+              </a:ext>
+            </a:extLst>
+          </p:cNvPr>
+          <p:cNvSpPr>
+            <a:spLocks noGrp="1"/>
+          </p:cNvSpPr>
+          <p:nvPr>
+            <p:ph type="title"/>
+          </p:nvPr>
+        </p:nvSpPr>
+        <p:spPr/>
+        <p:txBody>
+          <a:bodyPr/>
+          <a:lstStyle/>
+          <a:p>
+            <a:r>
+              <a:rPr lang="en-US" dirty="0"/>
+              <a:t>Defining a custom composed tag annotation </a:t>
+            </a:r>
+          </a:p>
+        </p:txBody>
+      </p:sp>
+      <p:sp>
+        <p:nvSpPr>
+          <p:cNvPr id="3" name="Content Placeholder 2">
+            <a:extLst>
+              <a:ext uri="{FF2B5EF4-FFF2-40B4-BE49-F238E27FC236}">
+                <a16:creationId xmlns:a16="http://schemas.microsoft.com/office/drawing/2014/main" id="{87EC70AF-47EC-6A45-94DE-16F5822BD566}"/>
+              </a:ext>
+            </a:extLst>
+          </p:cNvPr>
+          <p:cNvSpPr>
+            <a:spLocks noGrp="1"/>
+          </p:cNvSpPr>
+          <p:nvPr>
+            <p:ph idx="1"/>
+          </p:nvPr>
+        </p:nvSpPr>
+        <p:spPr/>
+        <p:txBody>
+          <a:bodyPr>
+            <a:normAutofit fontScale="92500" lnSpcReduction="10000"/>
+          </a:bodyPr>
+          <a:lstStyle/>
+          <a:p>
+            <a:pPr marL="0" indent="0">
+              <a:buNone/>
+            </a:pPr>
+            <a:r>
+              <a:rPr lang="en-US" sz="2400" dirty="0">
+                <a:latin typeface="JetBrains Mono NL" panose="02000009000000000000" pitchFamily="49" charset="0"/>
+                <a:ea typeface="JetBrains Mono NL" panose="02000009000000000000" pitchFamily="49" charset="0"/>
+                <a:cs typeface="JetBrains Mono NL" panose="02000009000000000000" pitchFamily="49" charset="0"/>
+              </a:rPr>
+              <a:t>import </a:t>
+            </a:r>
+            <a:r>
+              <a:rPr lang="en-US" sz="2400" dirty="0" err="1">
+                <a:latin typeface="JetBrains Mono NL" panose="02000009000000000000" pitchFamily="49" charset="0"/>
+                <a:ea typeface="JetBrains Mono NL" panose="02000009000000000000" pitchFamily="49" charset="0"/>
+                <a:cs typeface="JetBrains Mono NL" panose="02000009000000000000" pitchFamily="49" charset="0"/>
+              </a:rPr>
+              <a:t>java.lang.annotation.ElementType</a:t>
+            </a:r>
+            <a:r>
+              <a:rPr lang="en-US" sz="2400" dirty="0">
+                <a:latin typeface="JetBrains Mono NL" panose="02000009000000000000" pitchFamily="49" charset="0"/>
+                <a:ea typeface="JetBrains Mono NL" panose="02000009000000000000" pitchFamily="49" charset="0"/>
+                <a:cs typeface="JetBrains Mono NL" panose="02000009000000000000" pitchFamily="49" charset="0"/>
+              </a:rPr>
+              <a:t>;</a:t>
+            </a:r>
+          </a:p>
+          <a:p>
+            <a:pPr marL="0" indent="0">
+              <a:buNone/>
+            </a:pPr>
+            <a:r>
+              <a:rPr lang="en-US" sz="2400" dirty="0">
+                <a:latin typeface="JetBrains Mono NL" panose="02000009000000000000" pitchFamily="49" charset="0"/>
+                <a:ea typeface="JetBrains Mono NL" panose="02000009000000000000" pitchFamily="49" charset="0"/>
+                <a:cs typeface="JetBrains Mono NL" panose="02000009000000000000" pitchFamily="49" charset="0"/>
+              </a:rPr>
+              <a:t>import </a:t>
+            </a:r>
+            <a:r>
+              <a:rPr lang="en-US" sz="2400" dirty="0" err="1">
+                <a:latin typeface="JetBrains Mono NL" panose="02000009000000000000" pitchFamily="49" charset="0"/>
+                <a:ea typeface="JetBrains Mono NL" panose="02000009000000000000" pitchFamily="49" charset="0"/>
+                <a:cs typeface="JetBrains Mono NL" panose="02000009000000000000" pitchFamily="49" charset="0"/>
+              </a:rPr>
+              <a:t>java.lang.annotation.Retention</a:t>
+            </a:r>
+            <a:r>
+              <a:rPr lang="en-US" sz="2400" dirty="0">
+                <a:latin typeface="JetBrains Mono NL" panose="02000009000000000000" pitchFamily="49" charset="0"/>
+                <a:ea typeface="JetBrains Mono NL" panose="02000009000000000000" pitchFamily="49" charset="0"/>
+                <a:cs typeface="JetBrains Mono NL" panose="02000009000000000000" pitchFamily="49" charset="0"/>
+              </a:rPr>
+              <a:t>;</a:t>
+            </a:r>
+          </a:p>
+          <a:p>
+            <a:pPr marL="0" indent="0">
+              <a:buNone/>
+            </a:pPr>
+            <a:r>
+              <a:rPr lang="en-US" sz="2400" dirty="0">
+                <a:latin typeface="JetBrains Mono NL" panose="02000009000000000000" pitchFamily="49" charset="0"/>
+                <a:ea typeface="JetBrains Mono NL" panose="02000009000000000000" pitchFamily="49" charset="0"/>
+                <a:cs typeface="JetBrains Mono NL" panose="02000009000000000000" pitchFamily="49" charset="0"/>
+              </a:rPr>
+              <a:t>import </a:t>
+            </a:r>
+            <a:r>
+              <a:rPr lang="en-US" sz="2400" dirty="0" err="1">
+                <a:latin typeface="JetBrains Mono NL" panose="02000009000000000000" pitchFamily="49" charset="0"/>
+                <a:ea typeface="JetBrains Mono NL" panose="02000009000000000000" pitchFamily="49" charset="0"/>
+                <a:cs typeface="JetBrains Mono NL" panose="02000009000000000000" pitchFamily="49" charset="0"/>
+              </a:rPr>
+              <a:t>java.lang.annotation.RetentionPolicy</a:t>
+            </a:r>
+            <a:r>
+              <a:rPr lang="en-US" sz="2400" dirty="0">
+                <a:latin typeface="JetBrains Mono NL" panose="02000009000000000000" pitchFamily="49" charset="0"/>
+                <a:ea typeface="JetBrains Mono NL" panose="02000009000000000000" pitchFamily="49" charset="0"/>
+                <a:cs typeface="JetBrains Mono NL" panose="02000009000000000000" pitchFamily="49" charset="0"/>
+              </a:rPr>
+              <a:t>;</a:t>
+            </a:r>
+          </a:p>
+          <a:p>
+            <a:pPr marL="0" indent="0">
+              <a:buNone/>
+            </a:pPr>
+            <a:r>
+              <a:rPr lang="en-US" sz="2400" dirty="0">
+                <a:latin typeface="JetBrains Mono NL" panose="02000009000000000000" pitchFamily="49" charset="0"/>
+                <a:ea typeface="JetBrains Mono NL" panose="02000009000000000000" pitchFamily="49" charset="0"/>
+                <a:cs typeface="JetBrains Mono NL" panose="02000009000000000000" pitchFamily="49" charset="0"/>
+              </a:rPr>
+              <a:t>import </a:t>
+            </a:r>
+            <a:r>
+              <a:rPr lang="en-US" sz="2400" dirty="0" err="1">
+                <a:latin typeface="JetBrains Mono NL" panose="02000009000000000000" pitchFamily="49" charset="0"/>
+                <a:ea typeface="JetBrains Mono NL" panose="02000009000000000000" pitchFamily="49" charset="0"/>
+                <a:cs typeface="JetBrains Mono NL" panose="02000009000000000000" pitchFamily="49" charset="0"/>
+              </a:rPr>
+              <a:t>java.lang.annotation.Target</a:t>
+            </a:r>
+            <a:r>
+              <a:rPr lang="en-US" sz="2400" dirty="0">
+                <a:latin typeface="JetBrains Mono NL" panose="02000009000000000000" pitchFamily="49" charset="0"/>
+                <a:ea typeface="JetBrains Mono NL" panose="02000009000000000000" pitchFamily="49" charset="0"/>
+                <a:cs typeface="JetBrains Mono NL" panose="02000009000000000000" pitchFamily="49" charset="0"/>
+              </a:rPr>
+              <a:t>;</a:t>
+            </a:r>
+          </a:p>
+          <a:p>
+            <a:pPr marL="0" indent="0">
+              <a:buNone/>
+            </a:pPr>
+            <a:endParaRPr lang="en-US" sz="2400" dirty="0">
+              <a:latin typeface="JetBrains Mono NL" panose="02000009000000000000" pitchFamily="49" charset="0"/>
+              <a:ea typeface="JetBrains Mono NL" panose="02000009000000000000" pitchFamily="49" charset="0"/>
+              <a:cs typeface="JetBrains Mono NL" panose="02000009000000000000" pitchFamily="49" charset="0"/>
+            </a:endParaRPr>
+          </a:p>
+          <a:p>
+            <a:pPr marL="0" indent="0">
+              <a:buNone/>
+            </a:pPr>
+            <a:r>
+              <a:rPr lang="en-US" sz="2400" dirty="0">
+                <a:latin typeface="JetBrains Mono NL" panose="02000009000000000000" pitchFamily="49" charset="0"/>
+                <a:ea typeface="JetBrains Mono NL" panose="02000009000000000000" pitchFamily="49" charset="0"/>
+                <a:cs typeface="JetBrains Mono NL" panose="02000009000000000000" pitchFamily="49" charset="0"/>
+              </a:rPr>
+              <a:t>import </a:t>
+            </a:r>
+            <a:r>
+              <a:rPr lang="en-US" sz="2400" dirty="0" err="1">
+                <a:latin typeface="JetBrains Mono NL" panose="02000009000000000000" pitchFamily="49" charset="0"/>
+                <a:ea typeface="JetBrains Mono NL" panose="02000009000000000000" pitchFamily="49" charset="0"/>
+                <a:cs typeface="JetBrains Mono NL" panose="02000009000000000000" pitchFamily="49" charset="0"/>
+              </a:rPr>
+              <a:t>org.junit.jupiter.api.Tag</a:t>
+            </a:r>
+            <a:r>
+              <a:rPr lang="en-US" sz="2400" dirty="0">
+                <a:latin typeface="JetBrains Mono NL" panose="02000009000000000000" pitchFamily="49" charset="0"/>
+                <a:ea typeface="JetBrains Mono NL" panose="02000009000000000000" pitchFamily="49" charset="0"/>
+                <a:cs typeface="JetBrains Mono NL" panose="02000009000000000000" pitchFamily="49" charset="0"/>
+              </a:rPr>
+              <a:t>;</a:t>
+            </a:r>
+          </a:p>
+          <a:p>
+            <a:pPr marL="0" indent="0">
+              <a:buNone/>
+            </a:pPr>
+            <a:endParaRPr lang="en-US" sz="2400" dirty="0">
+              <a:latin typeface="JetBrains Mono NL" panose="02000009000000000000" pitchFamily="49" charset="0"/>
+              <a:ea typeface="JetBrains Mono NL" panose="02000009000000000000" pitchFamily="49" charset="0"/>
+              <a:cs typeface="JetBrains Mono NL" panose="02000009000000000000" pitchFamily="49" charset="0"/>
+            </a:endParaRPr>
+          </a:p>
+          <a:p>
+            <a:pPr marL="0" indent="0">
+              <a:buNone/>
+            </a:pPr>
+            <a:r>
+              <a:rPr lang="en-US" sz="2400" dirty="0">
+                <a:latin typeface="JetBrains Mono NL" panose="02000009000000000000" pitchFamily="49" charset="0"/>
+                <a:ea typeface="JetBrains Mono NL" panose="02000009000000000000" pitchFamily="49" charset="0"/>
+                <a:cs typeface="JetBrains Mono NL" panose="02000009000000000000" pitchFamily="49" charset="0"/>
+              </a:rPr>
+              <a:t>@Target({ </a:t>
+            </a:r>
+            <a:r>
+              <a:rPr lang="en-US" sz="2400" dirty="0" err="1">
+                <a:latin typeface="JetBrains Mono NL" panose="02000009000000000000" pitchFamily="49" charset="0"/>
+                <a:ea typeface="JetBrains Mono NL" panose="02000009000000000000" pitchFamily="49" charset="0"/>
+                <a:cs typeface="JetBrains Mono NL" panose="02000009000000000000" pitchFamily="49" charset="0"/>
+              </a:rPr>
+              <a:t>ElementType.TYPE</a:t>
+            </a:r>
+            <a:r>
+              <a:rPr lang="en-US" sz="2400" dirty="0">
+                <a:latin typeface="JetBrains Mono NL" panose="02000009000000000000" pitchFamily="49" charset="0"/>
+                <a:ea typeface="JetBrains Mono NL" panose="02000009000000000000" pitchFamily="49" charset="0"/>
+                <a:cs typeface="JetBrains Mono NL" panose="02000009000000000000" pitchFamily="49" charset="0"/>
+              </a:rPr>
+              <a:t>, </a:t>
+            </a:r>
+            <a:r>
+              <a:rPr lang="en-US" sz="2400" dirty="0" err="1">
+                <a:latin typeface="JetBrains Mono NL" panose="02000009000000000000" pitchFamily="49" charset="0"/>
+                <a:ea typeface="JetBrains Mono NL" panose="02000009000000000000" pitchFamily="49" charset="0"/>
+                <a:cs typeface="JetBrains Mono NL" panose="02000009000000000000" pitchFamily="49" charset="0"/>
+              </a:rPr>
+              <a:t>ElementType.METHOD</a:t>
+            </a:r>
+            <a:r>
+              <a:rPr lang="en-US" sz="2400" dirty="0">
+                <a:latin typeface="JetBrains Mono NL" panose="02000009000000000000" pitchFamily="49" charset="0"/>
+                <a:ea typeface="JetBrains Mono NL" panose="02000009000000000000" pitchFamily="49" charset="0"/>
+                <a:cs typeface="JetBrains Mono NL" panose="02000009000000000000" pitchFamily="49" charset="0"/>
+              </a:rPr>
+              <a:t> })</a:t>
+            </a:r>
+          </a:p>
+          <a:p>
+            <a:pPr marL="0" indent="0">
+              <a:buNone/>
+            </a:pPr>
+            <a:r>
+              <a:rPr lang="en-US" sz="2400" dirty="0">
+                <a:latin typeface="JetBrains Mono NL" panose="02000009000000000000" pitchFamily="49" charset="0"/>
+                <a:ea typeface="JetBrains Mono NL" panose="02000009000000000000" pitchFamily="49" charset="0"/>
+                <a:cs typeface="JetBrains Mono NL" panose="02000009000000000000" pitchFamily="49" charset="0"/>
+              </a:rPr>
+              <a:t>@Retention(</a:t>
+            </a:r>
+            <a:r>
+              <a:rPr lang="en-US" sz="2400" dirty="0" err="1">
+                <a:latin typeface="JetBrains Mono NL" panose="02000009000000000000" pitchFamily="49" charset="0"/>
+                <a:ea typeface="JetBrains Mono NL" panose="02000009000000000000" pitchFamily="49" charset="0"/>
+                <a:cs typeface="JetBrains Mono NL" panose="02000009000000000000" pitchFamily="49" charset="0"/>
+              </a:rPr>
+              <a:t>RetentionPolicy.RUNTIME</a:t>
+            </a:r>
+            <a:r>
+              <a:rPr lang="en-US" sz="2400" dirty="0">
+                <a:latin typeface="JetBrains Mono NL" panose="02000009000000000000" pitchFamily="49" charset="0"/>
+                <a:ea typeface="JetBrains Mono NL" panose="02000009000000000000" pitchFamily="49" charset="0"/>
+                <a:cs typeface="JetBrains Mono NL" panose="02000009000000000000" pitchFamily="49" charset="0"/>
+              </a:rPr>
+              <a:t>)</a:t>
+            </a:r>
+          </a:p>
+          <a:p>
+            <a:pPr marL="0" indent="0">
+              <a:buNone/>
+            </a:pPr>
+            <a:r>
+              <a:rPr lang="en-US" sz="2400" dirty="0">
+                <a:latin typeface="JetBrains Mono NL" panose="02000009000000000000" pitchFamily="49" charset="0"/>
+                <a:ea typeface="JetBrains Mono NL" panose="02000009000000000000" pitchFamily="49" charset="0"/>
+                <a:cs typeface="JetBrains Mono NL" panose="02000009000000000000" pitchFamily="49" charset="0"/>
+              </a:rPr>
+              <a:t>@Tag(”unit")</a:t>
+            </a:r>
+          </a:p>
+          <a:p>
+            <a:pPr marL="0" indent="0">
+              <a:buNone/>
+            </a:pPr>
+            <a:r>
+              <a:rPr lang="en-US" sz="2400" dirty="0">
+                <a:latin typeface="JetBrains Mono NL" panose="02000009000000000000" pitchFamily="49" charset="0"/>
+                <a:ea typeface="JetBrains Mono NL" panose="02000009000000000000" pitchFamily="49" charset="0"/>
+                <a:cs typeface="JetBrains Mono NL" panose="02000009000000000000" pitchFamily="49" charset="0"/>
+              </a:rPr>
+              <a:t>public @interface </a:t>
+            </a:r>
+            <a:r>
+              <a:rPr lang="en-US" sz="2400" dirty="0" err="1">
+                <a:latin typeface="JetBrains Mono NL" panose="02000009000000000000" pitchFamily="49" charset="0"/>
+                <a:ea typeface="JetBrains Mono NL" panose="02000009000000000000" pitchFamily="49" charset="0"/>
+                <a:cs typeface="JetBrains Mono NL" panose="02000009000000000000" pitchFamily="49" charset="0"/>
+              </a:rPr>
+              <a:t>UnitTest</a:t>
+            </a:r>
+            <a:r>
+              <a:rPr lang="en-US" sz="2400" dirty="0">
+                <a:latin typeface="JetBrains Mono NL" panose="02000009000000000000" pitchFamily="49" charset="0"/>
+                <a:ea typeface="JetBrains Mono NL" panose="02000009000000000000" pitchFamily="49" charset="0"/>
+                <a:cs typeface="JetBrains Mono NL" panose="02000009000000000000" pitchFamily="49" charset="0"/>
+              </a:rPr>
+              <a:t> {}</a:t>
+            </a:r>
+          </a:p>
+          <a:p>
+            <a:pPr marL="0" indent="0">
+              <a:buNone/>
+            </a:pPr>
+            <a:endParaRPr lang="en-US" dirty="0"/>
+          </a:p>
+        </p:txBody>
+      </p:sp>
+    </p:spTree>
+    <p:extLst>
+      <p:ext uri="{BB962C8B-B14F-4D97-AF65-F5344CB8AC3E}">
+        <p14:creationId xmlns:p14="http://schemas.microsoft.com/office/powerpoint/2010/main" val="3276669302"/>
+      </p:ext>
+    </p:extLst>
+  </p:cSld>
+  <p:clrMapOvr>
+    <a:masterClrMapping/>
+  </p:clrMapOvr>
+</p:sld>
+</file>
+
+<file path=ppt/slides/slide11.xml><?xml version="1.0" encoding="utf-8"?>
+<p:sld xmlns:a="http://schemas.openxmlformats.org/drawingml/2006/main" xmlns:r="http://schemas.openxmlformats.org/officeDocument/2006/relationships" xmlns:p="http://schemas.openxmlformats.org/presentationml/2006/main">
+  <p:cSld>
+    <p:spTree>
+      <p:nvGrpSpPr>
+        <p:cNvPr id="1" name=""/>
+        <p:cNvGrpSpPr/>
+        <p:nvPr/>
+      </p:nvGrpSpPr>
+      <p:grpSpPr>
+        <a:xfrm>
+          <a:off x="0" y="0"/>
+          <a:ext cx="0" cy="0"/>
+          <a:chOff x="0" y="0"/>
+          <a:chExt cx="0" cy="0"/>
+        </a:xfrm>
+      </p:grpSpPr>
+      <p:sp>
+        <p:nvSpPr>
+          <p:cNvPr id="2" name="Title 1">
+            <a:extLst>
+              <a:ext uri="{FF2B5EF4-FFF2-40B4-BE49-F238E27FC236}">
+                <a16:creationId xmlns:a16="http://schemas.microsoft.com/office/drawing/2014/main" id="{F16FB4B6-F5FB-B340-96A5-810828854123}"/>
+              </a:ext>
+            </a:extLst>
+          </p:cNvPr>
+          <p:cNvSpPr>
+            <a:spLocks noGrp="1"/>
+          </p:cNvSpPr>
+          <p:nvPr>
+            <p:ph type="title"/>
+          </p:nvPr>
+        </p:nvSpPr>
+        <p:spPr/>
+        <p:txBody>
+          <a:bodyPr/>
+          <a:lstStyle/>
+          <a:p>
+            <a:endParaRPr lang="en-US"/>
+          </a:p>
+        </p:txBody>
+      </p:sp>
+      <p:sp>
+        <p:nvSpPr>
+          <p:cNvPr id="3" name="Content Placeholder 2">
+            <a:extLst>
+              <a:ext uri="{FF2B5EF4-FFF2-40B4-BE49-F238E27FC236}">
+                <a16:creationId xmlns:a16="http://schemas.microsoft.com/office/drawing/2014/main" id="{BD6B5338-6587-8D45-B481-949B6950C26F}"/>
+              </a:ext>
+            </a:extLst>
+          </p:cNvPr>
+          <p:cNvSpPr>
+            <a:spLocks noGrp="1"/>
+          </p:cNvSpPr>
+          <p:nvPr>
+            <p:ph idx="1"/>
+          </p:nvPr>
+        </p:nvSpPr>
+        <p:spPr/>
+        <p:txBody>
+          <a:bodyPr/>
+          <a:lstStyle/>
+          <a:p>
+            <a:endParaRPr lang="en-US"/>
+          </a:p>
+        </p:txBody>
+      </p:sp>
+    </p:spTree>
+    <p:extLst>
+      <p:ext uri="{BB962C8B-B14F-4D97-AF65-F5344CB8AC3E}">
+        <p14:creationId xmlns:p14="http://schemas.microsoft.com/office/powerpoint/2010/main" val="3455420006"/>
+      </p:ext>
+    </p:extLst>
+  </p:cSld>
+  <p:clrMapOvr>
+    <a:masterClrMapping/>
+  </p:clrMapOvr>
+</p:sld>
+</file>
+
+<file path=ppt/slides/slide12.xml><?xml version="1.0" encoding="utf-8"?>
+<p:sld xmlns:a="http://schemas.openxmlformats.org/drawingml/2006/main" xmlns:r="http://schemas.openxmlformats.org/officeDocument/2006/relationships" xmlns:p="http://schemas.openxmlformats.org/presentationml/2006/main">
+  <p:cSld>
+    <p:spTree>
+      <p:nvGrpSpPr>
+        <p:cNvPr id="1" name=""/>
+        <p:cNvGrpSpPr/>
+        <p:nvPr/>
+      </p:nvGrpSpPr>
+      <p:grpSpPr>
+        <a:xfrm>
+          <a:off x="0" y="0"/>
+          <a:ext cx="0" cy="0"/>
+          <a:chOff x="0" y="0"/>
+          <a:chExt cx="0" cy="0"/>
+        </a:xfrm>
+      </p:grpSpPr>
+      <p:sp>
+        <p:nvSpPr>
+          <p:cNvPr id="2" name="Title 1">
+            <a:extLst>
+              <a:ext uri="{FF2B5EF4-FFF2-40B4-BE49-F238E27FC236}">
+                <a16:creationId xmlns:a16="http://schemas.microsoft.com/office/drawing/2014/main" id="{B07AAECE-E6A6-5147-9F5D-6E8D62DC202E}"/>
+              </a:ext>
+            </a:extLst>
+          </p:cNvPr>
+          <p:cNvSpPr>
+            <a:spLocks noGrp="1"/>
+          </p:cNvSpPr>
+          <p:nvPr>
+            <p:ph type="title"/>
+          </p:nvPr>
+        </p:nvSpPr>
+        <p:spPr/>
+        <p:txBody>
+          <a:bodyPr/>
+          <a:lstStyle/>
+          <a:p>
+            <a:endParaRPr lang="en-US"/>
+          </a:p>
+        </p:txBody>
+      </p:sp>
+      <p:sp>
+        <p:nvSpPr>
+          <p:cNvPr id="3" name="Content Placeholder 2">
+            <a:extLst>
+              <a:ext uri="{FF2B5EF4-FFF2-40B4-BE49-F238E27FC236}">
+                <a16:creationId xmlns:a16="http://schemas.microsoft.com/office/drawing/2014/main" id="{3476895F-1B3C-4F42-84DE-64F4ADA10DE4}"/>
+              </a:ext>
+            </a:extLst>
+          </p:cNvPr>
+          <p:cNvSpPr>
+            <a:spLocks noGrp="1"/>
+          </p:cNvSpPr>
+          <p:nvPr>
+            <p:ph idx="1"/>
+          </p:nvPr>
+        </p:nvSpPr>
+        <p:spPr/>
+        <p:txBody>
+          <a:bodyPr/>
+          <a:lstStyle/>
+          <a:p>
+            <a:endParaRPr lang="en-US"/>
+          </a:p>
+        </p:txBody>
+      </p:sp>
+    </p:spTree>
+    <p:extLst>
+      <p:ext uri="{BB962C8B-B14F-4D97-AF65-F5344CB8AC3E}">
+        <p14:creationId xmlns:p14="http://schemas.microsoft.com/office/powerpoint/2010/main" val="3850544628"/>
+      </p:ext>
+    </p:extLst>
+  </p:cSld>
+  <p:clrMapOvr>
+    <a:masterClrMapping/>
+  </p:clrMapOvr>
+</p:sld>
+</file>
+
+<file path=ppt/slides/slide13.xml><?xml version="1.0" encoding="utf-8"?>
+<p:sld xmlns:a="http://schemas.openxmlformats.org/drawingml/2006/main" xmlns:r="http://schemas.openxmlformats.org/officeDocument/2006/relationships" xmlns:p="http://schemas.openxmlformats.org/presentationml/2006/main">
+  <p:cSld>
+    <p:spTree>
+      <p:nvGrpSpPr>
+        <p:cNvPr id="1" name=""/>
+        <p:cNvGrpSpPr/>
+        <p:nvPr/>
+      </p:nvGrpSpPr>
+      <p:grpSpPr>
+        <a:xfrm>
+          <a:off x="0" y="0"/>
+          <a:ext cx="0" cy="0"/>
+          <a:chOff x="0" y="0"/>
+          <a:chExt cx="0" cy="0"/>
+        </a:xfrm>
+      </p:grpSpPr>
+      <p:sp>
+        <p:nvSpPr>
+          <p:cNvPr id="2" name="Title 1">
+            <a:extLst>
+              <a:ext uri="{FF2B5EF4-FFF2-40B4-BE49-F238E27FC236}">
+                <a16:creationId xmlns:a16="http://schemas.microsoft.com/office/drawing/2014/main" id="{922361E1-B77C-8046-BBFD-8D459DCF34B1}"/>
+              </a:ext>
+            </a:extLst>
+          </p:cNvPr>
+          <p:cNvSpPr>
+            <a:spLocks noGrp="1"/>
+          </p:cNvSpPr>
+          <p:nvPr>
+            <p:ph type="title"/>
+          </p:nvPr>
+        </p:nvSpPr>
+        <p:spPr/>
+        <p:txBody>
+          <a:bodyPr/>
+          <a:lstStyle/>
+          <a:p>
+            <a:endParaRPr lang="en-US"/>
+          </a:p>
+        </p:txBody>
+      </p:sp>
+      <p:sp>
+        <p:nvSpPr>
+          <p:cNvPr id="3" name="Content Placeholder 2">
+            <a:extLst>
+              <a:ext uri="{FF2B5EF4-FFF2-40B4-BE49-F238E27FC236}">
+                <a16:creationId xmlns:a16="http://schemas.microsoft.com/office/drawing/2014/main" id="{6725E61B-01E4-4449-BD30-44599B43A81D}"/>
+              </a:ext>
+            </a:extLst>
+          </p:cNvPr>
+          <p:cNvSpPr>
+            <a:spLocks noGrp="1"/>
+          </p:cNvSpPr>
+          <p:nvPr>
+            <p:ph idx="1"/>
+          </p:nvPr>
+        </p:nvSpPr>
+        <p:spPr/>
+        <p:txBody>
+          <a:bodyPr/>
+          <a:lstStyle/>
+          <a:p>
+            <a:endParaRPr lang="en-US"/>
+          </a:p>
+        </p:txBody>
+      </p:sp>
+    </p:spTree>
+    <p:extLst>
+      <p:ext uri="{BB962C8B-B14F-4D97-AF65-F5344CB8AC3E}">
+        <p14:creationId xmlns:p14="http://schemas.microsoft.com/office/powerpoint/2010/main" val="2945897422"/>
+      </p:ext>
+    </p:extLst>
+  </p:cSld>
+  <p:clrMapOvr>
+    <a:masterClrMapping/>
+  </p:clrMapOvr>
+</p:sld>
+</file>
+
+<file path=ppt/slides/slide14.xml><?xml version="1.0" encoding="utf-8"?>
+<p:sld xmlns:a="http://schemas.openxmlformats.org/drawingml/2006/main" xmlns:r="http://schemas.openxmlformats.org/officeDocument/2006/relationships" xmlns:p="http://schemas.openxmlformats.org/presentationml/2006/main">
+  <p:cSld>
+    <p:spTree>
+      <p:nvGrpSpPr>
+        <p:cNvPr id="1" name=""/>
+        <p:cNvGrpSpPr/>
+        <p:nvPr/>
+      </p:nvGrpSpPr>
+      <p:grpSpPr>
+        <a:xfrm>
+          <a:off x="0" y="0"/>
+          <a:ext cx="0" cy="0"/>
+          <a:chOff x="0" y="0"/>
+          <a:chExt cx="0" cy="0"/>
+        </a:xfrm>
+      </p:grpSpPr>
+      <p:sp>
+        <p:nvSpPr>
+          <p:cNvPr id="2" name="Title 1">
+            <a:extLst>
+              <a:ext uri="{FF2B5EF4-FFF2-40B4-BE49-F238E27FC236}">
+                <a16:creationId xmlns:a16="http://schemas.microsoft.com/office/drawing/2014/main" id="{FC4476BD-850C-704F-B250-92DE51E161A2}"/>
+              </a:ext>
+            </a:extLst>
+          </p:cNvPr>
+          <p:cNvSpPr>
+            <a:spLocks noGrp="1"/>
+          </p:cNvSpPr>
+          <p:nvPr>
+            <p:ph type="title"/>
+          </p:nvPr>
+        </p:nvSpPr>
+        <p:spPr/>
+        <p:txBody>
+          <a:bodyPr/>
+          <a:lstStyle/>
+          <a:p>
+            <a:endParaRPr lang="en-US"/>
+          </a:p>
+        </p:txBody>
+      </p:sp>
+      <p:sp>
+        <p:nvSpPr>
+          <p:cNvPr id="3" name="Content Placeholder 2">
+            <a:extLst>
+              <a:ext uri="{FF2B5EF4-FFF2-40B4-BE49-F238E27FC236}">
+                <a16:creationId xmlns:a16="http://schemas.microsoft.com/office/drawing/2014/main" id="{993449F2-D96C-4A49-9C25-0C960A920CE4}"/>
+              </a:ext>
+            </a:extLst>
+          </p:cNvPr>
+          <p:cNvSpPr>
+            <a:spLocks noGrp="1"/>
+          </p:cNvSpPr>
+          <p:nvPr>
+            <p:ph idx="1"/>
+          </p:nvPr>
+        </p:nvSpPr>
+        <p:spPr/>
+        <p:txBody>
+          <a:bodyPr/>
+          <a:lstStyle/>
+          <a:p>
+            <a:endParaRPr lang="en-US"/>
+          </a:p>
+        </p:txBody>
+      </p:sp>
+    </p:spTree>
+    <p:extLst>
+      <p:ext uri="{BB962C8B-B14F-4D97-AF65-F5344CB8AC3E}">
+        <p14:creationId xmlns:p14="http://schemas.microsoft.com/office/powerpoint/2010/main" val="1215044150"/>
+      </p:ext>
+    </p:extLst>
+  </p:cSld>
+  <p:clrMapOvr>
+    <a:masterClrMapping/>
+  </p:clrMapOvr>
+</p:sld>
+</file>
+
+<file path=ppt/slides/slide15.xml><?xml version="1.0" encoding="utf-8"?>
+<p:sld xmlns:a="http://schemas.openxmlformats.org/drawingml/2006/main" xmlns:r="http://schemas.openxmlformats.org/officeDocument/2006/relationships" xmlns:p="http://schemas.openxmlformats.org/presentationml/2006/main">
+  <p:cSld>
+    <p:spTree>
+      <p:nvGrpSpPr>
+        <p:cNvPr id="1" name=""/>
+        <p:cNvGrpSpPr/>
+        <p:nvPr/>
+      </p:nvGrpSpPr>
+      <p:grpSpPr>
+        <a:xfrm>
+          <a:off x="0" y="0"/>
+          <a:ext cx="0" cy="0"/>
+          <a:chOff x="0" y="0"/>
+          <a:chExt cx="0" cy="0"/>
+        </a:xfrm>
+      </p:grpSpPr>
+      <p:sp>
+        <p:nvSpPr>
+          <p:cNvPr id="2" name="Title 1">
+            <a:extLst>
+              <a:ext uri="{FF2B5EF4-FFF2-40B4-BE49-F238E27FC236}">
+                <a16:creationId xmlns:a16="http://schemas.microsoft.com/office/drawing/2014/main" id="{EF948449-51E6-9148-82F6-455F26533FA8}"/>
+              </a:ext>
+            </a:extLst>
+          </p:cNvPr>
+          <p:cNvSpPr>
+            <a:spLocks noGrp="1"/>
+          </p:cNvSpPr>
+          <p:nvPr>
+            <p:ph type="title"/>
+          </p:nvPr>
+        </p:nvSpPr>
+        <p:spPr/>
+        <p:txBody>
+          <a:bodyPr/>
+          <a:lstStyle/>
+          <a:p>
+            <a:r>
+              <a:rPr lang="en-US" dirty="0"/>
+              <a:t>References</a:t>
+            </a:r>
+          </a:p>
+        </p:txBody>
+      </p:sp>
+      <p:sp>
+        <p:nvSpPr>
+          <p:cNvPr id="3" name="Content Placeholder 2">
+            <a:extLst>
+              <a:ext uri="{FF2B5EF4-FFF2-40B4-BE49-F238E27FC236}">
+                <a16:creationId xmlns:a16="http://schemas.microsoft.com/office/drawing/2014/main" id="{813F127E-461D-714F-B0A3-A39A056EAE55}"/>
+              </a:ext>
+            </a:extLst>
+          </p:cNvPr>
+          <p:cNvSpPr>
+            <a:spLocks noGrp="1"/>
+          </p:cNvSpPr>
+          <p:nvPr>
+            <p:ph idx="1"/>
+          </p:nvPr>
+        </p:nvSpPr>
+        <p:spPr/>
+        <p:txBody>
+          <a:bodyPr/>
+          <a:lstStyle/>
+          <a:p>
+            <a:r>
+              <a:rPr lang="en-US" dirty="0">
+                <a:hlinkClick r:id="rId2"/>
+              </a:rPr>
+              <a:t>https://stackoverflow.com/questions/60308578/what-is-the-difference-between-extendwithspringextension-class-and-extendwit</a:t>
+            </a:r>
+            <a:endParaRPr lang="en-US" dirty="0"/>
+          </a:p>
+          <a:p>
+            <a:r>
+              <a:rPr lang="en-US" dirty="0">
+                <a:hlinkClick r:id="rId3"/>
+              </a:rPr>
+              <a:t>https://www.baeldung.com/spring-import-annotation</a:t>
+            </a:r>
+            <a:endParaRPr lang="en-US" dirty="0"/>
+          </a:p>
+          <a:p>
+            <a:r>
+              <a:rPr lang="en-US" dirty="0">
+                <a:hlinkClick r:id="rId4"/>
+              </a:rPr>
+              <a:t>https://www.baeldung.com/junit-5-extensions</a:t>
+            </a:r>
+            <a:endParaRPr lang="en-US" dirty="0"/>
+          </a:p>
+          <a:p>
+            <a:endParaRPr lang="en-US" dirty="0"/>
+          </a:p>
+          <a:p>
+            <a:endParaRPr lang="en-US" dirty="0"/>
+          </a:p>
+          <a:p>
+            <a:endParaRPr lang="en-US" dirty="0"/>
+          </a:p>
+        </p:txBody>
+      </p:sp>
+    </p:spTree>
+    <p:extLst>
+      <p:ext uri="{BB962C8B-B14F-4D97-AF65-F5344CB8AC3E}">
+        <p14:creationId xmlns:p14="http://schemas.microsoft.com/office/powerpoint/2010/main" val="3225130834"/>
+      </p:ext>
+    </p:extLst>
+  </p:cSld>
+  <p:clrMapOvr>
+    <a:masterClrMapping/>
+  </p:clrMapOvr>
+</p:sld>
+</file>
+
 <file path=ppt/slides/slide2.xml><?xml version="1.0" encoding="utf-8"?>
 <p:sld xmlns:a="http://schemas.openxmlformats.org/drawingml/2006/main" xmlns:r="http://schemas.openxmlformats.org/officeDocument/2006/relationships" xmlns:p="http://schemas.openxmlformats.org/presentationml/2006/main">
   <p:cSld>
@@ -3497,7 +4309,7 @@
             <a:pPr lvl="1"/>
             <a:r>
               <a:rPr lang="en-US" dirty="0"/>
-              <a:t>There is no domain-specific language (DSL) like Gherkin.</a:t>
+              <a:t>There is no domain-specific language (DSL) like Gherkin (unless you use a JUnit 5 extension).</a:t>
             </a:r>
           </a:p>
           <a:p>
@@ -3967,7 +4779,9 @@
         </p:nvSpPr>
         <p:spPr/>
         <p:txBody>
-          <a:bodyPr/>
+          <a:bodyPr>
+            <a:normAutofit/>
+          </a:bodyPr>
           <a:lstStyle/>
           <a:p>
             <a:r>
@@ -3976,6 +4790,13 @@
             </a:r>
           </a:p>
           <a:p>
+            <a:pPr lvl="1"/>
+            <a:r>
+              <a:rPr lang="en-US" dirty="0"/>
+              <a:t>Extend the behavior of test classes or methods.</a:t>
+            </a:r>
+          </a:p>
+          <a:p>
             <a:r>
               <a:rPr lang="en-US" dirty="0"/>
               <a:t>Provides an opportunity for third-party tools or APIs through the extension model. </a:t>
@@ -3990,31 +4811,24 @@
           <a:p>
             <a:r>
               <a:rPr lang="en-US" dirty="0"/>
-              <a:t>Overcomes the limitations of competing JUnit 4’s extension points</a:t>
-            </a:r>
-          </a:p>
-          <a:p>
-            <a:pPr lvl="1"/>
-            <a:r>
-              <a:rPr lang="en-US" dirty="0"/>
-              <a:t>Runner</a:t>
-            </a:r>
-          </a:p>
-          <a:p>
-            <a:pPr lvl="1"/>
+              <a:t>Overcomes the limitations of competing JUnit 4’s extension points (Runner, </a:t>
+            </a:r>
             <a:r>
               <a:rPr lang="en-US" dirty="0" err="1"/>
               <a:t>TestRule</a:t>
             </a:r>
-            <a:endParaRPr lang="en-US" dirty="0"/>
-          </a:p>
-          <a:p>
-            <a:pPr lvl="1"/>
-            <a:r>
-              <a:rPr lang="en-US"/>
-              <a:t>MethodRule </a:t>
-            </a:r>
-            <a:endParaRPr lang="en-US" dirty="0"/>
+            <a:r>
+              <a:rPr lang="en-US" dirty="0"/>
+              <a:t>, </a:t>
+            </a:r>
+            <a:r>
+              <a:rPr lang="en-US" dirty="0" err="1"/>
+              <a:t>MethodRule</a:t>
+            </a:r>
+            <a:r>
+              <a:rPr lang="en-US" dirty="0"/>
+              <a:t>) </a:t>
+            </a:r>
           </a:p>
         </p:txBody>
       </p:sp>
@@ -4070,64 +4884,139 @@
           <a:lstStyle/>
           <a:p>
             <a:r>
-              <a:rPr lang="en-US" dirty="0"/>
+              <a:rPr lang="en-US" dirty="0">
+                <a:latin typeface="JetBrains Mono NL" panose="02000009000000000000" pitchFamily="49" charset="0"/>
+                <a:ea typeface="JetBrains Mono NL" panose="02000009000000000000" pitchFamily="49" charset="0"/>
+                <a:cs typeface="JetBrains Mono NL" panose="02000009000000000000" pitchFamily="49" charset="0"/>
+              </a:rPr>
               <a:t>@</a:t>
             </a:r>
             <a:r>
+              <a:rPr lang="en-US" dirty="0" err="1">
+                <a:latin typeface="JetBrains Mono NL" panose="02000009000000000000" pitchFamily="49" charset="0"/>
+                <a:ea typeface="JetBrains Mono NL" panose="02000009000000000000" pitchFamily="49" charset="0"/>
+                <a:cs typeface="JetBrains Mono NL" panose="02000009000000000000" pitchFamily="49" charset="0"/>
+              </a:rPr>
+              <a:t>ExtendWith</a:t>
+            </a:r>
+            <a:r>
+              <a:rPr lang="en-US" dirty="0"/>
+              <a:t> annotation</a:t>
+            </a:r>
+          </a:p>
+        </p:txBody>
+      </p:sp>
+      <p:sp>
+        <p:nvSpPr>
+          <p:cNvPr id="3" name="Content Placeholder 2">
+            <a:extLst>
+              <a:ext uri="{FF2B5EF4-FFF2-40B4-BE49-F238E27FC236}">
+                <a16:creationId xmlns:a16="http://schemas.microsoft.com/office/drawing/2014/main" id="{52E68A71-BC17-5D4F-BC93-8B7E374EBDDC}"/>
+              </a:ext>
+            </a:extLst>
+          </p:cNvPr>
+          <p:cNvSpPr>
+            <a:spLocks noGrp="1"/>
+          </p:cNvSpPr>
+          <p:nvPr>
+            <p:ph idx="1"/>
+          </p:nvPr>
+        </p:nvSpPr>
+        <p:spPr/>
+        <p:txBody>
+          <a:bodyPr/>
+          <a:lstStyle/>
+          <a:p>
+            <a:r>
+              <a:rPr lang="en-US" dirty="0"/>
+              <a:t>Allows registering a JUnit Jupiter extension.</a:t>
+            </a:r>
+          </a:p>
+          <a:p>
+            <a:pPr lvl="1"/>
+            <a:r>
+              <a:rPr lang="en-US" dirty="0"/>
+              <a:t>Multiple extensions can be specified by adding the @</a:t>
+            </a:r>
+            <a:r>
               <a:rPr lang="en-US" dirty="0" err="1"/>
+              <a:t>ExtendWith</a:t>
+            </a:r>
+            <a:r>
+              <a:rPr lang="en-US" dirty="0"/>
+              <a:t> annotation multiple time to a test, or having a single @</a:t>
+            </a:r>
+            <a:r>
+              <a:rPr lang="en-US" dirty="0" err="1"/>
+              <a:t>ExtendWith</a:t>
+            </a:r>
+            <a:r>
+              <a:rPr lang="en-US" dirty="0"/>
+              <a:t> annotation receive a list of extensions as a parameter.</a:t>
+            </a:r>
+          </a:p>
+          <a:p>
+            <a:r>
+              <a:rPr lang="en-US" dirty="0"/>
+              <a:t>Third parties will provide the extensions.</a:t>
+            </a:r>
+          </a:p>
+          <a:p>
+            <a:pPr lvl="1"/>
+            <a:r>
+              <a:rPr lang="en-US" dirty="0"/>
+              <a:t>Mockito, Spring Framework, </a:t>
+            </a:r>
+            <a:r>
+              <a:rPr lang="en-US" dirty="0" err="1"/>
+              <a:t>upREST</a:t>
+            </a:r>
+            <a:r>
+              <a:rPr lang="en-US" dirty="0"/>
+              <a:t>, many others</a:t>
+            </a:r>
+          </a:p>
+          <a:p>
+            <a:pPr lvl="1"/>
+            <a:r>
+              <a:rPr lang="en-US" dirty="0">
+                <a:hlinkClick r:id="rId2"/>
+              </a:rPr>
+              <a:t>https://github.com/junit-team/junit5/wiki/Third-party-Extensions</a:t>
+            </a:r>
+            <a:endParaRPr lang="en-US" dirty="0"/>
+          </a:p>
+          <a:p>
+            <a:r>
+              <a:rPr lang="en-US" dirty="0"/>
+              <a:t>Replaces JUnit 4 </a:t>
+            </a:r>
+            <a:r>
+              <a:rPr lang="en-US" dirty="0">
+                <a:latin typeface="JetBrains Mono NL" panose="02000009000000000000" pitchFamily="49" charset="0"/>
+                <a:ea typeface="JetBrains Mono NL" panose="02000009000000000000" pitchFamily="49" charset="0"/>
+                <a:cs typeface="JetBrains Mono NL" panose="02000009000000000000" pitchFamily="49" charset="0"/>
+              </a:rPr>
+              <a:t>@</a:t>
+            </a:r>
+            <a:r>
+              <a:rPr lang="en-US" dirty="0" err="1">
+                <a:latin typeface="JetBrains Mono NL" panose="02000009000000000000" pitchFamily="49" charset="0"/>
+                <a:ea typeface="JetBrains Mono NL" panose="02000009000000000000" pitchFamily="49" charset="0"/>
+                <a:cs typeface="JetBrains Mono NL" panose="02000009000000000000" pitchFamily="49" charset="0"/>
+              </a:rPr>
               <a:t>RunWith</a:t>
             </a:r>
             <a:r>
               <a:rPr lang="en-US" dirty="0"/>
-              <a:t> annotation</a:t>
-            </a:r>
-          </a:p>
-        </p:txBody>
-      </p:sp>
-      <p:sp>
-        <p:nvSpPr>
-          <p:cNvPr id="3" name="Content Placeholder 2">
-            <a:extLst>
-              <a:ext uri="{FF2B5EF4-FFF2-40B4-BE49-F238E27FC236}">
-                <a16:creationId xmlns:a16="http://schemas.microsoft.com/office/drawing/2014/main" id="{52E68A71-BC17-5D4F-BC93-8B7E374EBDDC}"/>
-              </a:ext>
-            </a:extLst>
-          </p:cNvPr>
-          <p:cNvSpPr>
-            <a:spLocks noGrp="1"/>
-          </p:cNvSpPr>
-          <p:nvPr>
-            <p:ph idx="1"/>
-          </p:nvPr>
-        </p:nvSpPr>
-        <p:spPr/>
-        <p:txBody>
-          <a:bodyPr/>
-          <a:lstStyle/>
-          <a:p>
-            <a:r>
-              <a:rPr lang="en-US" dirty="0"/>
-              <a:t>Allows using JUnit Jupiter extensions.</a:t>
-            </a:r>
-          </a:p>
-          <a:p>
-            <a:r>
-              <a:rPr lang="en-US" dirty="0"/>
-              <a:t>Third parties will provide the extensions.</a:t>
+              <a:t>.</a:t>
             </a:r>
           </a:p>
           <a:p>
             <a:pPr lvl="1"/>
             <a:r>
               <a:rPr lang="en-US" dirty="0"/>
-              <a:t>Mockito</a:t>
-            </a:r>
-          </a:p>
-          <a:p>
-            <a:pPr lvl="1"/>
-            <a:r>
-              <a:rPr lang="en-US" dirty="0"/>
-              <a:t>Spring Framework</a:t>
+              <a:t>Can still be used in JUnit 5, but does not allow using JUnit 5 extensions.</a:t>
             </a:r>
           </a:p>
         </p:txBody>
@@ -4167,7 +5056,7 @@
           <p:cNvPr id="2" name="Title 1">
             <a:extLst>
               <a:ext uri="{FF2B5EF4-FFF2-40B4-BE49-F238E27FC236}">
-                <a16:creationId xmlns:a16="http://schemas.microsoft.com/office/drawing/2014/main" id="{EF948449-51E6-9148-82F6-455F26533FA8}"/>
+                <a16:creationId xmlns:a16="http://schemas.microsoft.com/office/drawing/2014/main" id="{FF723C7F-CEB2-5544-B1BA-E9E901C06A1E}"/>
               </a:ext>
             </a:extLst>
           </p:cNvPr>
@@ -4185,8 +5074,13 @@
           <a:p>
             <a:r>
               <a:rPr lang="en-US" dirty="0"/>
-              <a:t>References</a:t>
-            </a:r>
+              <a:t>Using @</a:t>
+            </a:r>
+            <a:r>
+              <a:rPr lang="en-US" dirty="0" err="1"/>
+              <a:t>ExtendWith</a:t>
+            </a:r>
+            <a:endParaRPr lang="en-US" dirty="0"/>
           </a:p>
         </p:txBody>
       </p:sp>
@@ -4195,7 +5089,7 @@
           <p:cNvPr id="3" name="Content Placeholder 2">
             <a:extLst>
               <a:ext uri="{FF2B5EF4-FFF2-40B4-BE49-F238E27FC236}">
-                <a16:creationId xmlns:a16="http://schemas.microsoft.com/office/drawing/2014/main" id="{813F127E-461D-714F-B0A3-A39A056EAE55}"/>
+                <a16:creationId xmlns:a16="http://schemas.microsoft.com/office/drawing/2014/main" id="{A4BB7724-3709-F445-9DA5-9A0FA288577A}"/>
               </a:ext>
             </a:extLst>
           </p:cNvPr>
@@ -4208,38 +5102,402 @@
         </p:nvSpPr>
         <p:spPr/>
         <p:txBody>
-          <a:bodyPr/>
-          <a:lstStyle/>
-          <a:p>
-            <a:r>
-              <a:rPr lang="en-US" dirty="0">
-                <a:hlinkClick r:id="rId2"/>
-              </a:rPr>
-              <a:t>https://stackoverflow.com/questions/60308578/what-is-the-difference-between-extendwithspringextension-class-and-extendwit</a:t>
-            </a:r>
-            <a:endParaRPr lang="en-US" dirty="0"/>
-          </a:p>
-          <a:p>
-            <a:r>
-              <a:rPr lang="en-US" dirty="0">
-                <a:hlinkClick r:id="rId3"/>
-              </a:rPr>
-              <a:t>https://www.baeldung.com/spring-import-annotation</a:t>
-            </a:r>
-            <a:endParaRPr lang="en-US" dirty="0"/>
-          </a:p>
-          <a:p>
-            <a:endParaRPr lang="en-US" dirty="0"/>
-          </a:p>
-          <a:p>
-            <a:endParaRPr lang="en-US" dirty="0"/>
+          <a:bodyPr>
+            <a:normAutofit/>
+          </a:bodyPr>
+          <a:lstStyle/>
+          <a:p>
+            <a:pPr marL="0" indent="0">
+              <a:buNone/>
+            </a:pPr>
+            <a:r>
+              <a:rPr lang="en-US" sz="2000" dirty="0">
+                <a:latin typeface="JetBrains Mono NL" panose="02000009000000000000" pitchFamily="49" charset="0"/>
+                <a:ea typeface="JetBrains Mono NL" panose="02000009000000000000" pitchFamily="49" charset="0"/>
+                <a:cs typeface="JetBrains Mono NL" panose="02000009000000000000" pitchFamily="49" charset="0"/>
+              </a:rPr>
+              <a:t>@</a:t>
+            </a:r>
+            <a:r>
+              <a:rPr lang="en-US" sz="2000" dirty="0" err="1">
+                <a:latin typeface="JetBrains Mono NL" panose="02000009000000000000" pitchFamily="49" charset="0"/>
+                <a:ea typeface="JetBrains Mono NL" panose="02000009000000000000" pitchFamily="49" charset="0"/>
+                <a:cs typeface="JetBrains Mono NL" panose="02000009000000000000" pitchFamily="49" charset="0"/>
+              </a:rPr>
+              <a:t>ExtendWith</a:t>
+            </a:r>
+            <a:r>
+              <a:rPr lang="en-US" sz="2000" dirty="0">
+                <a:latin typeface="JetBrains Mono NL" panose="02000009000000000000" pitchFamily="49" charset="0"/>
+                <a:ea typeface="JetBrains Mono NL" panose="02000009000000000000" pitchFamily="49" charset="0"/>
+                <a:cs typeface="JetBrains Mono NL" panose="02000009000000000000" pitchFamily="49" charset="0"/>
+              </a:rPr>
+              <a:t>({ </a:t>
+            </a:r>
+            <a:r>
+              <a:rPr lang="en-US" sz="2000" dirty="0" err="1">
+                <a:latin typeface="JetBrains Mono NL" panose="02000009000000000000" pitchFamily="49" charset="0"/>
+                <a:ea typeface="JetBrains Mono NL" panose="02000009000000000000" pitchFamily="49" charset="0"/>
+                <a:cs typeface="JetBrains Mono NL" panose="02000009000000000000" pitchFamily="49" charset="0"/>
+              </a:rPr>
+              <a:t>EnvironmentExtension.class</a:t>
+            </a:r>
+            <a:r>
+              <a:rPr lang="en-US" sz="2000" dirty="0">
+                <a:latin typeface="JetBrains Mono NL" panose="02000009000000000000" pitchFamily="49" charset="0"/>
+                <a:ea typeface="JetBrains Mono NL" panose="02000009000000000000" pitchFamily="49" charset="0"/>
+                <a:cs typeface="JetBrains Mono NL" panose="02000009000000000000" pitchFamily="49" charset="0"/>
+              </a:rPr>
+              <a:t>, 	</a:t>
+            </a:r>
+            <a:r>
+              <a:rPr lang="en-US" sz="2000" dirty="0" err="1">
+                <a:latin typeface="JetBrains Mono NL" panose="02000009000000000000" pitchFamily="49" charset="0"/>
+                <a:ea typeface="JetBrains Mono NL" panose="02000009000000000000" pitchFamily="49" charset="0"/>
+                <a:cs typeface="JetBrains Mono NL" panose="02000009000000000000" pitchFamily="49" charset="0"/>
+              </a:rPr>
+              <a:t>EmployeeDatabaseSetupExtension.class</a:t>
+            </a:r>
+            <a:r>
+              <a:rPr lang="en-US" sz="2000" dirty="0">
+                <a:latin typeface="JetBrains Mono NL" panose="02000009000000000000" pitchFamily="49" charset="0"/>
+                <a:ea typeface="JetBrains Mono NL" panose="02000009000000000000" pitchFamily="49" charset="0"/>
+                <a:cs typeface="JetBrains Mono NL" panose="02000009000000000000" pitchFamily="49" charset="0"/>
+              </a:rPr>
+              <a:t>, 	</a:t>
+            </a:r>
+            <a:r>
+              <a:rPr lang="en-US" sz="2000" dirty="0" err="1">
+                <a:latin typeface="JetBrains Mono NL" panose="02000009000000000000" pitchFamily="49" charset="0"/>
+                <a:ea typeface="JetBrains Mono NL" panose="02000009000000000000" pitchFamily="49" charset="0"/>
+                <a:cs typeface="JetBrains Mono NL" panose="02000009000000000000" pitchFamily="49" charset="0"/>
+              </a:rPr>
+              <a:t>EmployeeDaoParameterResolver.class</a:t>
+            </a:r>
+            <a:r>
+              <a:rPr lang="en-US" sz="2000" dirty="0">
+                <a:latin typeface="JetBrains Mono NL" panose="02000009000000000000" pitchFamily="49" charset="0"/>
+                <a:ea typeface="JetBrains Mono NL" panose="02000009000000000000" pitchFamily="49" charset="0"/>
+                <a:cs typeface="JetBrains Mono NL" panose="02000009000000000000" pitchFamily="49" charset="0"/>
+              </a:rPr>
+              <a:t> }) @</a:t>
+            </a:r>
+            <a:r>
+              <a:rPr lang="en-US" sz="2000" dirty="0" err="1">
+                <a:latin typeface="JetBrains Mono NL" panose="02000009000000000000" pitchFamily="49" charset="0"/>
+                <a:ea typeface="JetBrains Mono NL" panose="02000009000000000000" pitchFamily="49" charset="0"/>
+                <a:cs typeface="JetBrains Mono NL" panose="02000009000000000000" pitchFamily="49" charset="0"/>
+              </a:rPr>
+              <a:t>ExtendWith</a:t>
+            </a:r>
+            <a:r>
+              <a:rPr lang="en-US" sz="2000" dirty="0">
+                <a:latin typeface="JetBrains Mono NL" panose="02000009000000000000" pitchFamily="49" charset="0"/>
+                <a:ea typeface="JetBrains Mono NL" panose="02000009000000000000" pitchFamily="49" charset="0"/>
+                <a:cs typeface="JetBrains Mono NL" panose="02000009000000000000" pitchFamily="49" charset="0"/>
+              </a:rPr>
+              <a:t>(</a:t>
+            </a:r>
+            <a:r>
+              <a:rPr lang="en-US" sz="2000" dirty="0" err="1">
+                <a:latin typeface="JetBrains Mono NL" panose="02000009000000000000" pitchFamily="49" charset="0"/>
+                <a:ea typeface="JetBrains Mono NL" panose="02000009000000000000" pitchFamily="49" charset="0"/>
+                <a:cs typeface="JetBrains Mono NL" panose="02000009000000000000" pitchFamily="49" charset="0"/>
+              </a:rPr>
+              <a:t>LoggingExtension.class</a:t>
+            </a:r>
+            <a:r>
+              <a:rPr lang="en-US" sz="2000" dirty="0">
+                <a:latin typeface="JetBrains Mono NL" panose="02000009000000000000" pitchFamily="49" charset="0"/>
+                <a:ea typeface="JetBrains Mono NL" panose="02000009000000000000" pitchFamily="49" charset="0"/>
+                <a:cs typeface="JetBrains Mono NL" panose="02000009000000000000" pitchFamily="49" charset="0"/>
+              </a:rPr>
+              <a:t>) @</a:t>
+            </a:r>
+            <a:r>
+              <a:rPr lang="en-US" sz="2000" dirty="0" err="1">
+                <a:latin typeface="JetBrains Mono NL" panose="02000009000000000000" pitchFamily="49" charset="0"/>
+                <a:ea typeface="JetBrains Mono NL" panose="02000009000000000000" pitchFamily="49" charset="0"/>
+                <a:cs typeface="JetBrains Mono NL" panose="02000009000000000000" pitchFamily="49" charset="0"/>
+              </a:rPr>
+              <a:t>ExtendWith</a:t>
+            </a:r>
+            <a:r>
+              <a:rPr lang="en-US" sz="2000" dirty="0">
+                <a:latin typeface="JetBrains Mono NL" panose="02000009000000000000" pitchFamily="49" charset="0"/>
+                <a:ea typeface="JetBrains Mono NL" panose="02000009000000000000" pitchFamily="49" charset="0"/>
+                <a:cs typeface="JetBrains Mono NL" panose="02000009000000000000" pitchFamily="49" charset="0"/>
+              </a:rPr>
+              <a:t>(</a:t>
+            </a:r>
+            <a:r>
+              <a:rPr lang="en-US" sz="2000" dirty="0" err="1">
+                <a:latin typeface="JetBrains Mono NL" panose="02000009000000000000" pitchFamily="49" charset="0"/>
+                <a:ea typeface="JetBrains Mono NL" panose="02000009000000000000" pitchFamily="49" charset="0"/>
+                <a:cs typeface="JetBrains Mono NL" panose="02000009000000000000" pitchFamily="49" charset="0"/>
+              </a:rPr>
+              <a:t>IgnoreFileNotFoundExceptionExtension.class</a:t>
+            </a:r>
+            <a:r>
+              <a:rPr lang="en-US" sz="2000" dirty="0">
+                <a:latin typeface="JetBrains Mono NL" panose="02000009000000000000" pitchFamily="49" charset="0"/>
+                <a:ea typeface="JetBrains Mono NL" panose="02000009000000000000" pitchFamily="49" charset="0"/>
+                <a:cs typeface="JetBrains Mono NL" panose="02000009000000000000" pitchFamily="49" charset="0"/>
+              </a:rPr>
+              <a:t>) </a:t>
+            </a:r>
+            <a:br>
+              <a:rPr lang="en-US" sz="2000" dirty="0">
+                <a:latin typeface="JetBrains Mono NL" panose="02000009000000000000" pitchFamily="49" charset="0"/>
+                <a:ea typeface="JetBrains Mono NL" panose="02000009000000000000" pitchFamily="49" charset="0"/>
+                <a:cs typeface="JetBrains Mono NL" panose="02000009000000000000" pitchFamily="49" charset="0"/>
+              </a:rPr>
+            </a:br>
+            <a:r>
+              <a:rPr lang="en-US" sz="2000" b="1" dirty="0">
+                <a:latin typeface="JetBrains Mono NL" panose="02000009000000000000" pitchFamily="49" charset="0"/>
+                <a:ea typeface="JetBrains Mono NL" panose="02000009000000000000" pitchFamily="49" charset="0"/>
+                <a:cs typeface="JetBrains Mono NL" panose="02000009000000000000" pitchFamily="49" charset="0"/>
+              </a:rPr>
+              <a:t>public</a:t>
+            </a:r>
+            <a:r>
+              <a:rPr lang="en-US" sz="2000" dirty="0">
+                <a:latin typeface="JetBrains Mono NL" panose="02000009000000000000" pitchFamily="49" charset="0"/>
+                <a:ea typeface="JetBrains Mono NL" panose="02000009000000000000" pitchFamily="49" charset="0"/>
+                <a:cs typeface="JetBrains Mono NL" panose="02000009000000000000" pitchFamily="49" charset="0"/>
+              </a:rPr>
+              <a:t> </a:t>
+            </a:r>
+            <a:r>
+              <a:rPr lang="en-US" sz="2000" b="1" dirty="0">
+                <a:latin typeface="JetBrains Mono NL" panose="02000009000000000000" pitchFamily="49" charset="0"/>
+                <a:ea typeface="JetBrains Mono NL" panose="02000009000000000000" pitchFamily="49" charset="0"/>
+                <a:cs typeface="JetBrains Mono NL" panose="02000009000000000000" pitchFamily="49" charset="0"/>
+              </a:rPr>
+              <a:t>class</a:t>
+            </a:r>
+            <a:r>
+              <a:rPr lang="en-US" sz="2000" dirty="0">
+                <a:latin typeface="JetBrains Mono NL" panose="02000009000000000000" pitchFamily="49" charset="0"/>
+                <a:ea typeface="JetBrains Mono NL" panose="02000009000000000000" pitchFamily="49" charset="0"/>
+                <a:cs typeface="JetBrains Mono NL" panose="02000009000000000000" pitchFamily="49" charset="0"/>
+              </a:rPr>
+              <a:t> </a:t>
+            </a:r>
+            <a:r>
+              <a:rPr lang="en-US" sz="2000" b="1" dirty="0" err="1">
+                <a:latin typeface="JetBrains Mono NL" panose="02000009000000000000" pitchFamily="49" charset="0"/>
+                <a:ea typeface="JetBrains Mono NL" panose="02000009000000000000" pitchFamily="49" charset="0"/>
+                <a:cs typeface="JetBrains Mono NL" panose="02000009000000000000" pitchFamily="49" charset="0"/>
+              </a:rPr>
+              <a:t>EmployeesTest</a:t>
+            </a:r>
+            <a:r>
+              <a:rPr lang="en-US" sz="2000" dirty="0">
+                <a:latin typeface="JetBrains Mono NL" panose="02000009000000000000" pitchFamily="49" charset="0"/>
+                <a:ea typeface="JetBrains Mono NL" panose="02000009000000000000" pitchFamily="49" charset="0"/>
+                <a:cs typeface="JetBrains Mono NL" panose="02000009000000000000" pitchFamily="49" charset="0"/>
+              </a:rPr>
+              <a:t> {</a:t>
+            </a:r>
+          </a:p>
+          <a:p>
+            <a:pPr marL="0" indent="0">
+              <a:buNone/>
+            </a:pPr>
+            <a:r>
+              <a:rPr lang="en-US" sz="2000" dirty="0">
+                <a:latin typeface="JetBrains Mono NL" panose="02000009000000000000" pitchFamily="49" charset="0"/>
+                <a:ea typeface="JetBrains Mono NL" panose="02000009000000000000" pitchFamily="49" charset="0"/>
+                <a:cs typeface="JetBrains Mono NL" panose="02000009000000000000" pitchFamily="49" charset="0"/>
+              </a:rPr>
+              <a:t>	…</a:t>
+            </a:r>
+          </a:p>
+          <a:p>
+            <a:pPr marL="0" indent="0">
+              <a:buNone/>
+            </a:pPr>
+            <a:r>
+              <a:rPr lang="en-US" sz="2000" dirty="0">
+                <a:latin typeface="JetBrains Mono NL" panose="02000009000000000000" pitchFamily="49" charset="0"/>
+                <a:ea typeface="JetBrains Mono NL" panose="02000009000000000000" pitchFamily="49" charset="0"/>
+                <a:cs typeface="JetBrains Mono NL" panose="02000009000000000000" pitchFamily="49" charset="0"/>
+              </a:rPr>
+              <a:t>}</a:t>
+            </a:r>
           </a:p>
         </p:txBody>
       </p:sp>
     </p:spTree>
     <p:extLst>
       <p:ext uri="{BB962C8B-B14F-4D97-AF65-F5344CB8AC3E}">
-        <p14:creationId xmlns:p14="http://schemas.microsoft.com/office/powerpoint/2010/main" val="3225130834"/>
+        <p14:creationId xmlns:p14="http://schemas.microsoft.com/office/powerpoint/2010/main" val="1816896383"/>
+      </p:ext>
+    </p:extLst>
+  </p:cSld>
+  <p:clrMapOvr>
+    <a:masterClrMapping/>
+  </p:clrMapOvr>
+</p:sld>
+</file>
+
+<file path=ppt/slides/slide9.xml><?xml version="1.0" encoding="utf-8"?>
+<p:sld xmlns:a="http://schemas.openxmlformats.org/drawingml/2006/main" xmlns:r="http://schemas.openxmlformats.org/officeDocument/2006/relationships" xmlns:p="http://schemas.openxmlformats.org/presentationml/2006/main">
+  <p:cSld>
+    <p:spTree>
+      <p:nvGrpSpPr>
+        <p:cNvPr id="1" name=""/>
+        <p:cNvGrpSpPr/>
+        <p:nvPr/>
+      </p:nvGrpSpPr>
+      <p:grpSpPr>
+        <a:xfrm>
+          <a:off x="0" y="0"/>
+          <a:ext cx="0" cy="0"/>
+          <a:chOff x="0" y="0"/>
+          <a:chExt cx="0" cy="0"/>
+        </a:xfrm>
+      </p:grpSpPr>
+      <p:sp>
+        <p:nvSpPr>
+          <p:cNvPr id="2" name="Title 1">
+            <a:extLst>
+              <a:ext uri="{FF2B5EF4-FFF2-40B4-BE49-F238E27FC236}">
+                <a16:creationId xmlns:a16="http://schemas.microsoft.com/office/drawing/2014/main" id="{7DD002F8-70E9-474B-B6A8-93119BB9E68D}"/>
+              </a:ext>
+            </a:extLst>
+          </p:cNvPr>
+          <p:cNvSpPr>
+            <a:spLocks noGrp="1"/>
+          </p:cNvSpPr>
+          <p:nvPr>
+            <p:ph type="title"/>
+          </p:nvPr>
+        </p:nvSpPr>
+        <p:spPr/>
+        <p:txBody>
+          <a:bodyPr/>
+          <a:lstStyle/>
+          <a:p>
+            <a:r>
+              <a:rPr lang="en-US" dirty="0">
+                <a:latin typeface="JetBrains Mono NL" panose="02000009000000000000" pitchFamily="49" charset="0"/>
+                <a:ea typeface="JetBrains Mono NL" panose="02000009000000000000" pitchFamily="49" charset="0"/>
+                <a:cs typeface="JetBrains Mono NL" panose="02000009000000000000" pitchFamily="49" charset="0"/>
+              </a:rPr>
+              <a:t>@Tag</a:t>
+            </a:r>
+            <a:r>
+              <a:rPr lang="en-US" dirty="0"/>
+              <a:t> annotation</a:t>
+            </a:r>
+          </a:p>
+        </p:txBody>
+      </p:sp>
+      <p:sp>
+        <p:nvSpPr>
+          <p:cNvPr id="3" name="Content Placeholder 2">
+            <a:extLst>
+              <a:ext uri="{FF2B5EF4-FFF2-40B4-BE49-F238E27FC236}">
+                <a16:creationId xmlns:a16="http://schemas.microsoft.com/office/drawing/2014/main" id="{D22E0175-1943-CB4F-ABE3-691448EA68A0}"/>
+              </a:ext>
+            </a:extLst>
+          </p:cNvPr>
+          <p:cNvSpPr>
+            <a:spLocks noGrp="1"/>
+          </p:cNvSpPr>
+          <p:nvPr>
+            <p:ph idx="1"/>
+          </p:nvPr>
+        </p:nvSpPr>
+        <p:spPr/>
+        <p:txBody>
+          <a:bodyPr/>
+          <a:lstStyle/>
+          <a:p>
+            <a:r>
+              <a:rPr lang="en-US" dirty="0"/>
+              <a:t>Test classes and methods can be tagged via the </a:t>
+            </a:r>
+            <a:r>
+              <a:rPr lang="en-US" dirty="0">
+                <a:latin typeface="JetBrains Mono NL" panose="02000009000000000000" pitchFamily="49" charset="0"/>
+                <a:ea typeface="JetBrains Mono NL" panose="02000009000000000000" pitchFamily="49" charset="0"/>
+                <a:cs typeface="JetBrains Mono NL" panose="02000009000000000000" pitchFamily="49" charset="0"/>
+              </a:rPr>
+              <a:t>@Tag</a:t>
+            </a:r>
+            <a:r>
+              <a:rPr lang="en-US" dirty="0"/>
+              <a:t> annotation.</a:t>
+            </a:r>
+          </a:p>
+          <a:p>
+            <a:r>
+              <a:rPr lang="en-US" dirty="0"/>
+              <a:t>Those tags can later be used to filter test discovery and execution. </a:t>
+            </a:r>
+          </a:p>
+          <a:p>
+            <a:pPr lvl="1"/>
+            <a:r>
+              <a:rPr lang="en-US" dirty="0"/>
+              <a:t>Great way to segregate unit tests from integration tests.</a:t>
+            </a:r>
+          </a:p>
+          <a:p>
+            <a:r>
+              <a:rPr lang="en-US" dirty="0"/>
+              <a:t>Create custom composed annotations for commonly used tags in your system. </a:t>
+            </a:r>
+          </a:p>
+          <a:p>
+            <a:pPr lvl="1"/>
+            <a:r>
+              <a:rPr lang="en-US" dirty="0"/>
+              <a:t>For example, create a custom composed annotation </a:t>
+            </a:r>
+            <a:r>
+              <a:rPr lang="en-US" dirty="0">
+                <a:latin typeface="JetBrains Mono NL" panose="02000009000000000000" pitchFamily="49" charset="0"/>
+                <a:ea typeface="JetBrains Mono NL" panose="02000009000000000000" pitchFamily="49" charset="0"/>
+                <a:cs typeface="JetBrains Mono NL" panose="02000009000000000000" pitchFamily="49" charset="0"/>
+              </a:rPr>
+              <a:t>@</a:t>
+            </a:r>
+            <a:r>
+              <a:rPr lang="en-US" dirty="0" err="1">
+                <a:latin typeface="JetBrains Mono NL" panose="02000009000000000000" pitchFamily="49" charset="0"/>
+                <a:ea typeface="JetBrains Mono NL" panose="02000009000000000000" pitchFamily="49" charset="0"/>
+                <a:cs typeface="JetBrains Mono NL" panose="02000009000000000000" pitchFamily="49" charset="0"/>
+              </a:rPr>
+              <a:t>UnitTest</a:t>
+            </a:r>
+            <a:r>
+              <a:rPr lang="en-US" dirty="0"/>
+              <a:t>. It can then be used as a drop-in replacement for </a:t>
+            </a:r>
+            <a:r>
+              <a:rPr lang="en-US" dirty="0">
+                <a:latin typeface="JetBrains Mono NL" panose="02000009000000000000" pitchFamily="49" charset="0"/>
+                <a:ea typeface="JetBrains Mono NL" panose="02000009000000000000" pitchFamily="49" charset="0"/>
+                <a:cs typeface="JetBrains Mono NL" panose="02000009000000000000" pitchFamily="49" charset="0"/>
+              </a:rPr>
+              <a:t>@Tag(”unit")</a:t>
+            </a:r>
+            <a:r>
+              <a:rPr lang="en-US" dirty="0"/>
+              <a:t>.</a:t>
+            </a:r>
+          </a:p>
+        </p:txBody>
+      </p:sp>
+    </p:spTree>
+    <p:extLst>
+      <p:ext uri="{BB962C8B-B14F-4D97-AF65-F5344CB8AC3E}">
+        <p14:creationId xmlns:p14="http://schemas.microsoft.com/office/powerpoint/2010/main" val="319786894"/>
       </p:ext>
     </p:extLst>
   </p:cSld>

</xml_diff>

<commit_message>
JUnit 5 presentation changes
</commit_message>
<xml_diff>
--- a/presentations/Introduction to JUnit 5.pptx
+++ b/presentations/Introduction to JUnit 5.pptx
@@ -28,9 +28,7 @@
     <p:sldId id="282" r:id="rId22"/>
     <p:sldId id="283" r:id="rId23"/>
     <p:sldId id="278" r:id="rId24"/>
-    <p:sldId id="279" r:id="rId25"/>
-    <p:sldId id="280" r:id="rId26"/>
-    <p:sldId id="264" r:id="rId27"/>
+    <p:sldId id="264" r:id="rId25"/>
   </p:sldIdLst>
   <p:sldSz cx="12192000" cy="6858000"/>
   <p:notesSz cx="6858000" cy="9144000"/>
@@ -284,7 +282,7 @@
           <a:p>
             <a:fld id="{B38EF465-D677-F140-82CD-891C0463380E}" type="datetimeFigureOut">
               <a:rPr lang="en-US" smtClean="0"/>
-              <a:t>10/14/21</a:t>
+              <a:t>10/20/21</a:t>
             </a:fld>
             <a:endParaRPr lang="en-US"/>
           </a:p>
@@ -482,7 +480,7 @@
           <a:p>
             <a:fld id="{B38EF465-D677-F140-82CD-891C0463380E}" type="datetimeFigureOut">
               <a:rPr lang="en-US" smtClean="0"/>
-              <a:t>10/14/21</a:t>
+              <a:t>10/20/21</a:t>
             </a:fld>
             <a:endParaRPr lang="en-US"/>
           </a:p>
@@ -690,7 +688,7 @@
           <a:p>
             <a:fld id="{B38EF465-D677-F140-82CD-891C0463380E}" type="datetimeFigureOut">
               <a:rPr lang="en-US" smtClean="0"/>
-              <a:t>10/14/21</a:t>
+              <a:t>10/20/21</a:t>
             </a:fld>
             <a:endParaRPr lang="en-US"/>
           </a:p>
@@ -888,7 +886,7 @@
           <a:p>
             <a:fld id="{B38EF465-D677-F140-82CD-891C0463380E}" type="datetimeFigureOut">
               <a:rPr lang="en-US" smtClean="0"/>
-              <a:t>10/14/21</a:t>
+              <a:t>10/20/21</a:t>
             </a:fld>
             <a:endParaRPr lang="en-US"/>
           </a:p>
@@ -1163,7 +1161,7 @@
           <a:p>
             <a:fld id="{B38EF465-D677-F140-82CD-891C0463380E}" type="datetimeFigureOut">
               <a:rPr lang="en-US" smtClean="0"/>
-              <a:t>10/14/21</a:t>
+              <a:t>10/20/21</a:t>
             </a:fld>
             <a:endParaRPr lang="en-US"/>
           </a:p>
@@ -1428,7 +1426,7 @@
           <a:p>
             <a:fld id="{B38EF465-D677-F140-82CD-891C0463380E}" type="datetimeFigureOut">
               <a:rPr lang="en-US" smtClean="0"/>
-              <a:t>10/14/21</a:t>
+              <a:t>10/20/21</a:t>
             </a:fld>
             <a:endParaRPr lang="en-US"/>
           </a:p>
@@ -1840,7 +1838,7 @@
           <a:p>
             <a:fld id="{B38EF465-D677-F140-82CD-891C0463380E}" type="datetimeFigureOut">
               <a:rPr lang="en-US" smtClean="0"/>
-              <a:t>10/14/21</a:t>
+              <a:t>10/20/21</a:t>
             </a:fld>
             <a:endParaRPr lang="en-US"/>
           </a:p>
@@ -1981,7 +1979,7 @@
           <a:p>
             <a:fld id="{B38EF465-D677-F140-82CD-891C0463380E}" type="datetimeFigureOut">
               <a:rPr lang="en-US" smtClean="0"/>
-              <a:t>10/14/21</a:t>
+              <a:t>10/20/21</a:t>
             </a:fld>
             <a:endParaRPr lang="en-US"/>
           </a:p>
@@ -2094,7 +2092,7 @@
           <a:p>
             <a:fld id="{B38EF465-D677-F140-82CD-891C0463380E}" type="datetimeFigureOut">
               <a:rPr lang="en-US" smtClean="0"/>
-              <a:t>10/14/21</a:t>
+              <a:t>10/20/21</a:t>
             </a:fld>
             <a:endParaRPr lang="en-US"/>
           </a:p>
@@ -2405,7 +2403,7 @@
           <a:p>
             <a:fld id="{B38EF465-D677-F140-82CD-891C0463380E}" type="datetimeFigureOut">
               <a:rPr lang="en-US" smtClean="0"/>
-              <a:t>10/14/21</a:t>
+              <a:t>10/20/21</a:t>
             </a:fld>
             <a:endParaRPr lang="en-US"/>
           </a:p>
@@ -2693,7 +2691,7 @@
           <a:p>
             <a:fld id="{B38EF465-D677-F140-82CD-891C0463380E}" type="datetimeFigureOut">
               <a:rPr lang="en-US" smtClean="0"/>
-              <a:t>10/14/21</a:t>
+              <a:t>10/20/21</a:t>
             </a:fld>
             <a:endParaRPr lang="en-US"/>
           </a:p>
@@ -2934,7 +2932,7 @@
           <a:p>
             <a:fld id="{B38EF465-D677-F140-82CD-891C0463380E}" type="datetimeFigureOut">
               <a:rPr lang="en-US" smtClean="0"/>
-              <a:t>10/14/21</a:t>
+              <a:t>10/20/21</a:t>
             </a:fld>
             <a:endParaRPr lang="en-US"/>
           </a:p>
@@ -3493,7 +3491,7 @@
             </a:pPr>
             <a:r>
               <a:rPr lang="en-US" sz="2400" dirty="0">
-                <a:latin typeface="JetBrains Mono NL" panose="02000009000000000000" pitchFamily="49" charset="0"/>
+                <a:latin typeface="Courier" pitchFamily="2" charset="0"/>
                 <a:ea typeface="JetBrains Mono NL" panose="02000009000000000000" pitchFamily="49" charset="0"/>
                 <a:cs typeface="JetBrains Mono NL" panose="02000009000000000000" pitchFamily="49" charset="0"/>
               </a:rPr>
@@ -3501,7 +3499,7 @@
             </a:r>
             <a:r>
               <a:rPr lang="en-US" sz="2400" dirty="0" err="1">
-                <a:latin typeface="JetBrains Mono NL" panose="02000009000000000000" pitchFamily="49" charset="0"/>
+                <a:latin typeface="Courier" pitchFamily="2" charset="0"/>
                 <a:ea typeface="JetBrains Mono NL" panose="02000009000000000000" pitchFamily="49" charset="0"/>
                 <a:cs typeface="JetBrains Mono NL" panose="02000009000000000000" pitchFamily="49" charset="0"/>
               </a:rPr>
@@ -3509,7 +3507,7 @@
             </a:r>
             <a:r>
               <a:rPr lang="en-US" sz="2400" dirty="0">
-                <a:latin typeface="JetBrains Mono NL" panose="02000009000000000000" pitchFamily="49" charset="0"/>
+                <a:latin typeface="Courier" pitchFamily="2" charset="0"/>
                 <a:ea typeface="JetBrains Mono NL" panose="02000009000000000000" pitchFamily="49" charset="0"/>
                 <a:cs typeface="JetBrains Mono NL" panose="02000009000000000000" pitchFamily="49" charset="0"/>
               </a:rPr>
@@ -3522,7 +3520,7 @@
             </a:pPr>
             <a:r>
               <a:rPr lang="en-US" sz="2400" dirty="0">
-                <a:latin typeface="JetBrains Mono NL" panose="02000009000000000000" pitchFamily="49" charset="0"/>
+                <a:latin typeface="Courier" pitchFamily="2" charset="0"/>
                 <a:ea typeface="JetBrains Mono NL" panose="02000009000000000000" pitchFamily="49" charset="0"/>
                 <a:cs typeface="JetBrains Mono NL" panose="02000009000000000000" pitchFamily="49" charset="0"/>
               </a:rPr>
@@ -3530,7 +3528,7 @@
             </a:r>
             <a:r>
               <a:rPr lang="en-US" sz="2400" dirty="0" err="1">
-                <a:latin typeface="JetBrains Mono NL" panose="02000009000000000000" pitchFamily="49" charset="0"/>
+                <a:latin typeface="Courier" pitchFamily="2" charset="0"/>
                 <a:ea typeface="JetBrains Mono NL" panose="02000009000000000000" pitchFamily="49" charset="0"/>
                 <a:cs typeface="JetBrains Mono NL" panose="02000009000000000000" pitchFamily="49" charset="0"/>
               </a:rPr>
@@ -3538,7 +3536,7 @@
             </a:r>
             <a:r>
               <a:rPr lang="en-US" sz="2400" dirty="0">
-                <a:latin typeface="JetBrains Mono NL" panose="02000009000000000000" pitchFamily="49" charset="0"/>
+                <a:latin typeface="Courier" pitchFamily="2" charset="0"/>
                 <a:ea typeface="JetBrains Mono NL" panose="02000009000000000000" pitchFamily="49" charset="0"/>
                 <a:cs typeface="JetBrains Mono NL" panose="02000009000000000000" pitchFamily="49" charset="0"/>
               </a:rPr>
@@ -3551,7 +3549,7 @@
             </a:pPr>
             <a:r>
               <a:rPr lang="en-US" sz="2400" dirty="0">
-                <a:latin typeface="JetBrains Mono NL" panose="02000009000000000000" pitchFamily="49" charset="0"/>
+                <a:latin typeface="Courier" pitchFamily="2" charset="0"/>
                 <a:ea typeface="JetBrains Mono NL" panose="02000009000000000000" pitchFamily="49" charset="0"/>
                 <a:cs typeface="JetBrains Mono NL" panose="02000009000000000000" pitchFamily="49" charset="0"/>
               </a:rPr>
@@ -3559,7 +3557,7 @@
             </a:r>
             <a:r>
               <a:rPr lang="en-US" sz="2400" dirty="0" err="1">
-                <a:latin typeface="JetBrains Mono NL" panose="02000009000000000000" pitchFamily="49" charset="0"/>
+                <a:latin typeface="Courier" pitchFamily="2" charset="0"/>
                 <a:ea typeface="JetBrains Mono NL" panose="02000009000000000000" pitchFamily="49" charset="0"/>
                 <a:cs typeface="JetBrains Mono NL" panose="02000009000000000000" pitchFamily="49" charset="0"/>
               </a:rPr>
@@ -3567,7 +3565,7 @@
             </a:r>
             <a:r>
               <a:rPr lang="en-US" sz="2400" dirty="0">
-                <a:latin typeface="JetBrains Mono NL" panose="02000009000000000000" pitchFamily="49" charset="0"/>
+                <a:latin typeface="Courier" pitchFamily="2" charset="0"/>
                 <a:ea typeface="JetBrains Mono NL" panose="02000009000000000000" pitchFamily="49" charset="0"/>
                 <a:cs typeface="JetBrains Mono NL" panose="02000009000000000000" pitchFamily="49" charset="0"/>
               </a:rPr>
@@ -3580,7 +3578,7 @@
             </a:pPr>
             <a:r>
               <a:rPr lang="en-US" sz="2400" dirty="0">
-                <a:latin typeface="JetBrains Mono NL" panose="02000009000000000000" pitchFamily="49" charset="0"/>
+                <a:latin typeface="Courier" pitchFamily="2" charset="0"/>
                 <a:ea typeface="JetBrains Mono NL" panose="02000009000000000000" pitchFamily="49" charset="0"/>
                 <a:cs typeface="JetBrains Mono NL" panose="02000009000000000000" pitchFamily="49" charset="0"/>
               </a:rPr>
@@ -3588,7 +3586,7 @@
             </a:r>
             <a:r>
               <a:rPr lang="en-US" sz="2400" dirty="0" err="1">
-                <a:latin typeface="JetBrains Mono NL" panose="02000009000000000000" pitchFamily="49" charset="0"/>
+                <a:latin typeface="Courier" pitchFamily="2" charset="0"/>
                 <a:ea typeface="JetBrains Mono NL" panose="02000009000000000000" pitchFamily="49" charset="0"/>
                 <a:cs typeface="JetBrains Mono NL" panose="02000009000000000000" pitchFamily="49" charset="0"/>
               </a:rPr>
@@ -3596,7 +3594,7 @@
             </a:r>
             <a:r>
               <a:rPr lang="en-US" sz="2400" dirty="0">
-                <a:latin typeface="JetBrains Mono NL" panose="02000009000000000000" pitchFamily="49" charset="0"/>
+                <a:latin typeface="Courier" pitchFamily="2" charset="0"/>
                 <a:ea typeface="JetBrains Mono NL" panose="02000009000000000000" pitchFamily="49" charset="0"/>
                 <a:cs typeface="JetBrains Mono NL" panose="02000009000000000000" pitchFamily="49" charset="0"/>
               </a:rPr>
@@ -3608,7 +3606,7 @@
               <a:buNone/>
             </a:pPr>
             <a:endParaRPr lang="en-US" sz="2400" dirty="0">
-              <a:latin typeface="JetBrains Mono NL" panose="02000009000000000000" pitchFamily="49" charset="0"/>
+              <a:latin typeface="Courier" pitchFamily="2" charset="0"/>
               <a:ea typeface="JetBrains Mono NL" panose="02000009000000000000" pitchFamily="49" charset="0"/>
               <a:cs typeface="JetBrains Mono NL" panose="02000009000000000000" pitchFamily="49" charset="0"/>
             </a:endParaRPr>
@@ -3619,7 +3617,7 @@
             </a:pPr>
             <a:r>
               <a:rPr lang="en-US" sz="2400" dirty="0">
-                <a:latin typeface="JetBrains Mono NL" panose="02000009000000000000" pitchFamily="49" charset="0"/>
+                <a:latin typeface="Courier" pitchFamily="2" charset="0"/>
                 <a:ea typeface="JetBrains Mono NL" panose="02000009000000000000" pitchFamily="49" charset="0"/>
                 <a:cs typeface="JetBrains Mono NL" panose="02000009000000000000" pitchFamily="49" charset="0"/>
               </a:rPr>
@@ -3627,7 +3625,7 @@
             </a:r>
             <a:r>
               <a:rPr lang="en-US" sz="2400" dirty="0" err="1">
-                <a:latin typeface="JetBrains Mono NL" panose="02000009000000000000" pitchFamily="49" charset="0"/>
+                <a:latin typeface="Courier" pitchFamily="2" charset="0"/>
                 <a:ea typeface="JetBrains Mono NL" panose="02000009000000000000" pitchFamily="49" charset="0"/>
                 <a:cs typeface="JetBrains Mono NL" panose="02000009000000000000" pitchFamily="49" charset="0"/>
               </a:rPr>
@@ -3635,7 +3633,7 @@
             </a:r>
             <a:r>
               <a:rPr lang="en-US" sz="2400" dirty="0">
-                <a:latin typeface="JetBrains Mono NL" panose="02000009000000000000" pitchFamily="49" charset="0"/>
+                <a:latin typeface="Courier" pitchFamily="2" charset="0"/>
                 <a:ea typeface="JetBrains Mono NL" panose="02000009000000000000" pitchFamily="49" charset="0"/>
                 <a:cs typeface="JetBrains Mono NL" panose="02000009000000000000" pitchFamily="49" charset="0"/>
               </a:rPr>
@@ -3647,7 +3645,7 @@
               <a:buNone/>
             </a:pPr>
             <a:endParaRPr lang="en-US" sz="2400" dirty="0">
-              <a:latin typeface="JetBrains Mono NL" panose="02000009000000000000" pitchFamily="49" charset="0"/>
+              <a:latin typeface="Courier" pitchFamily="2" charset="0"/>
               <a:ea typeface="JetBrains Mono NL" panose="02000009000000000000" pitchFamily="49" charset="0"/>
               <a:cs typeface="JetBrains Mono NL" panose="02000009000000000000" pitchFamily="49" charset="0"/>
             </a:endParaRPr>
@@ -3658,7 +3656,7 @@
             </a:pPr>
             <a:r>
               <a:rPr lang="en-US" sz="2400" dirty="0">
-                <a:latin typeface="JetBrains Mono NL" panose="02000009000000000000" pitchFamily="49" charset="0"/>
+                <a:latin typeface="Courier" pitchFamily="2" charset="0"/>
                 <a:ea typeface="JetBrains Mono NL" panose="02000009000000000000" pitchFamily="49" charset="0"/>
                 <a:cs typeface="JetBrains Mono NL" panose="02000009000000000000" pitchFamily="49" charset="0"/>
               </a:rPr>
@@ -3666,7 +3664,7 @@
             </a:r>
             <a:r>
               <a:rPr lang="en-US" sz="2400" dirty="0" err="1">
-                <a:latin typeface="JetBrains Mono NL" panose="02000009000000000000" pitchFamily="49" charset="0"/>
+                <a:latin typeface="Courier" pitchFamily="2" charset="0"/>
                 <a:ea typeface="JetBrains Mono NL" panose="02000009000000000000" pitchFamily="49" charset="0"/>
                 <a:cs typeface="JetBrains Mono NL" panose="02000009000000000000" pitchFamily="49" charset="0"/>
               </a:rPr>
@@ -3674,7 +3672,7 @@
             </a:r>
             <a:r>
               <a:rPr lang="en-US" sz="2400" dirty="0">
-                <a:latin typeface="JetBrains Mono NL" panose="02000009000000000000" pitchFamily="49" charset="0"/>
+                <a:latin typeface="Courier" pitchFamily="2" charset="0"/>
                 <a:ea typeface="JetBrains Mono NL" panose="02000009000000000000" pitchFamily="49" charset="0"/>
                 <a:cs typeface="JetBrains Mono NL" panose="02000009000000000000" pitchFamily="49" charset="0"/>
               </a:rPr>
@@ -3682,7 +3680,7 @@
             </a:r>
             <a:r>
               <a:rPr lang="en-US" sz="2400" dirty="0" err="1">
-                <a:latin typeface="JetBrains Mono NL" panose="02000009000000000000" pitchFamily="49" charset="0"/>
+                <a:latin typeface="Courier" pitchFamily="2" charset="0"/>
                 <a:ea typeface="JetBrains Mono NL" panose="02000009000000000000" pitchFamily="49" charset="0"/>
                 <a:cs typeface="JetBrains Mono NL" panose="02000009000000000000" pitchFamily="49" charset="0"/>
               </a:rPr>
@@ -3690,7 +3688,7 @@
             </a:r>
             <a:r>
               <a:rPr lang="en-US" sz="2400" dirty="0">
-                <a:latin typeface="JetBrains Mono NL" panose="02000009000000000000" pitchFamily="49" charset="0"/>
+                <a:latin typeface="Courier" pitchFamily="2" charset="0"/>
                 <a:ea typeface="JetBrains Mono NL" panose="02000009000000000000" pitchFamily="49" charset="0"/>
                 <a:cs typeface="JetBrains Mono NL" panose="02000009000000000000" pitchFamily="49" charset="0"/>
               </a:rPr>
@@ -3703,7 +3701,7 @@
             </a:pPr>
             <a:r>
               <a:rPr lang="en-US" sz="2400" dirty="0">
-                <a:latin typeface="JetBrains Mono NL" panose="02000009000000000000" pitchFamily="49" charset="0"/>
+                <a:latin typeface="Courier" pitchFamily="2" charset="0"/>
                 <a:ea typeface="JetBrains Mono NL" panose="02000009000000000000" pitchFamily="49" charset="0"/>
                 <a:cs typeface="JetBrains Mono NL" panose="02000009000000000000" pitchFamily="49" charset="0"/>
               </a:rPr>
@@ -3711,7 +3709,7 @@
             </a:r>
             <a:r>
               <a:rPr lang="en-US" sz="2400" dirty="0" err="1">
-                <a:latin typeface="JetBrains Mono NL" panose="02000009000000000000" pitchFamily="49" charset="0"/>
+                <a:latin typeface="Courier" pitchFamily="2" charset="0"/>
                 <a:ea typeface="JetBrains Mono NL" panose="02000009000000000000" pitchFamily="49" charset="0"/>
                 <a:cs typeface="JetBrains Mono NL" panose="02000009000000000000" pitchFamily="49" charset="0"/>
               </a:rPr>
@@ -3719,7 +3717,7 @@
             </a:r>
             <a:r>
               <a:rPr lang="en-US" sz="2400" dirty="0">
-                <a:latin typeface="JetBrains Mono NL" panose="02000009000000000000" pitchFamily="49" charset="0"/>
+                <a:latin typeface="Courier" pitchFamily="2" charset="0"/>
                 <a:ea typeface="JetBrains Mono NL" panose="02000009000000000000" pitchFamily="49" charset="0"/>
                 <a:cs typeface="JetBrains Mono NL" panose="02000009000000000000" pitchFamily="49" charset="0"/>
               </a:rPr>
@@ -3732,7 +3730,7 @@
             </a:pPr>
             <a:r>
               <a:rPr lang="en-US" sz="2400" dirty="0">
-                <a:latin typeface="JetBrains Mono NL" panose="02000009000000000000" pitchFamily="49" charset="0"/>
+                <a:latin typeface="Courier" pitchFamily="2" charset="0"/>
                 <a:ea typeface="JetBrains Mono NL" panose="02000009000000000000" pitchFamily="49" charset="0"/>
                 <a:cs typeface="JetBrains Mono NL" panose="02000009000000000000" pitchFamily="49" charset="0"/>
               </a:rPr>
@@ -3745,7 +3743,7 @@
             </a:pPr>
             <a:r>
               <a:rPr lang="en-US" sz="2400" dirty="0">
-                <a:latin typeface="JetBrains Mono NL" panose="02000009000000000000" pitchFamily="49" charset="0"/>
+                <a:latin typeface="Courier" pitchFamily="2" charset="0"/>
                 <a:ea typeface="JetBrains Mono NL" panose="02000009000000000000" pitchFamily="49" charset="0"/>
                 <a:cs typeface="JetBrains Mono NL" panose="02000009000000000000" pitchFamily="49" charset="0"/>
               </a:rPr>
@@ -3753,7 +3751,7 @@
             </a:r>
             <a:r>
               <a:rPr lang="en-US" sz="2400" dirty="0" err="1">
-                <a:latin typeface="JetBrains Mono NL" panose="02000009000000000000" pitchFamily="49" charset="0"/>
+                <a:latin typeface="Courier" pitchFamily="2" charset="0"/>
                 <a:ea typeface="JetBrains Mono NL" panose="02000009000000000000" pitchFamily="49" charset="0"/>
                 <a:cs typeface="JetBrains Mono NL" panose="02000009000000000000" pitchFamily="49" charset="0"/>
               </a:rPr>
@@ -3761,7 +3759,7 @@
             </a:r>
             <a:r>
               <a:rPr lang="en-US" sz="2400" dirty="0">
-                <a:latin typeface="JetBrains Mono NL" panose="02000009000000000000" pitchFamily="49" charset="0"/>
+                <a:latin typeface="Courier" pitchFamily="2" charset="0"/>
                 <a:ea typeface="JetBrains Mono NL" panose="02000009000000000000" pitchFamily="49" charset="0"/>
                 <a:cs typeface="JetBrains Mono NL" panose="02000009000000000000" pitchFamily="49" charset="0"/>
               </a:rPr>
@@ -3829,7 +3827,7 @@
           <a:p>
             <a:r>
               <a:rPr lang="en-US" dirty="0">
-                <a:latin typeface="JetBrains Mono NL" panose="02000009000000000000" pitchFamily="49" charset="0"/>
+                <a:latin typeface="Courier" pitchFamily="2" charset="0"/>
                 <a:ea typeface="JetBrains Mono NL" panose="02000009000000000000" pitchFamily="49" charset="0"/>
                 <a:cs typeface="JetBrains Mono NL" panose="02000009000000000000" pitchFamily="49" charset="0"/>
               </a:rPr>
@@ -3948,16 +3946,16 @@
           <a:lstStyle/>
           <a:p>
             <a:r>
-              <a:rPr lang="en-US" b="1" dirty="0">
-                <a:latin typeface="JetBrains Mono NL" panose="02000009000000000000" pitchFamily="49" charset="0"/>
+              <a:rPr lang="en-US" dirty="0">
+                <a:latin typeface="Courier" pitchFamily="2" charset="0"/>
                 <a:ea typeface="JetBrains Mono NL" panose="02000009000000000000" pitchFamily="49" charset="0"/>
                 <a:cs typeface="JetBrains Mono NL" panose="02000009000000000000" pitchFamily="49" charset="0"/>
               </a:rPr>
               <a:t>@</a:t>
             </a:r>
             <a:r>
-              <a:rPr lang="en-US" b="1" dirty="0" err="1">
-                <a:latin typeface="JetBrains Mono NL" panose="02000009000000000000" pitchFamily="49" charset="0"/>
+              <a:rPr lang="en-US" dirty="0" err="1">
+                <a:latin typeface="Courier" pitchFamily="2" charset="0"/>
                 <a:ea typeface="JetBrains Mono NL" panose="02000009000000000000" pitchFamily="49" charset="0"/>
                 <a:cs typeface="JetBrains Mono NL" panose="02000009000000000000" pitchFamily="49" charset="0"/>
               </a:rPr>
@@ -4000,14 +3998,14 @@
           <a:p>
             <a:r>
               <a:rPr lang="en-US" sz="2000" dirty="0" err="1">
-                <a:latin typeface="JetBrains Mono NL" panose="02000009000000000000" pitchFamily="49" charset="0"/>
+                <a:latin typeface="Courier" pitchFamily="2" charset="0"/>
                 <a:ea typeface="JetBrains Mono NL" panose="02000009000000000000" pitchFamily="49" charset="0"/>
                 <a:cs typeface="JetBrains Mono NL" panose="02000009000000000000" pitchFamily="49" charset="0"/>
               </a:rPr>
               <a:t>DisplayNameGenerator.ReplaceUnderscores.class</a:t>
             </a:r>
             <a:endParaRPr lang="en-US" sz="2000" dirty="0">
-              <a:latin typeface="JetBrains Mono NL" panose="02000009000000000000" pitchFamily="49" charset="0"/>
+              <a:latin typeface="Courier" pitchFamily="2" charset="0"/>
               <a:ea typeface="JetBrains Mono NL" panose="02000009000000000000" pitchFamily="49" charset="0"/>
               <a:cs typeface="JetBrains Mono NL" panose="02000009000000000000" pitchFamily="49" charset="0"/>
             </a:endParaRPr>
@@ -4015,7 +4013,7 @@
           <a:p>
             <a:r>
               <a:rPr lang="en-US" sz="2000" dirty="0">
-                <a:latin typeface="JetBrains Mono NL" panose="02000009000000000000" pitchFamily="49" charset="0"/>
+                <a:latin typeface="Courier" pitchFamily="2" charset="0"/>
                 <a:ea typeface="JetBrains Mono NL" panose="02000009000000000000" pitchFamily="49" charset="0"/>
                 <a:cs typeface="JetBrains Mono NL" panose="02000009000000000000" pitchFamily="49" charset="0"/>
               </a:rPr>
@@ -4023,7 +4021,7 @@
             </a:r>
             <a:r>
               <a:rPr lang="en-US" sz="2000" dirty="0" err="1">
-                <a:latin typeface="JetBrains Mono NL" panose="02000009000000000000" pitchFamily="49" charset="0"/>
+                <a:latin typeface="Courier" pitchFamily="2" charset="0"/>
                 <a:ea typeface="JetBrains Mono NL" panose="02000009000000000000" pitchFamily="49" charset="0"/>
                 <a:cs typeface="JetBrains Mono NL" panose="02000009000000000000" pitchFamily="49" charset="0"/>
               </a:rPr>
@@ -4031,7 +4029,7 @@
             </a:r>
             <a:r>
               <a:rPr lang="en-US" sz="2000" dirty="0">
-                <a:latin typeface="JetBrains Mono NL" panose="02000009000000000000" pitchFamily="49" charset="0"/>
+                <a:latin typeface="Courier" pitchFamily="2" charset="0"/>
                 <a:ea typeface="JetBrains Mono NL" panose="02000009000000000000" pitchFamily="49" charset="0"/>
                 <a:cs typeface="JetBrains Mono NL" panose="02000009000000000000" pitchFamily="49" charset="0"/>
               </a:rPr>
@@ -4039,14 +4037,14 @@
             </a:r>
             <a:br>
               <a:rPr lang="en-US" sz="2000" dirty="0">
-                <a:latin typeface="JetBrains Mono NL" panose="02000009000000000000" pitchFamily="49" charset="0"/>
+                <a:latin typeface="Courier" pitchFamily="2" charset="0"/>
                 <a:ea typeface="JetBrains Mono NL" panose="02000009000000000000" pitchFamily="49" charset="0"/>
                 <a:cs typeface="JetBrains Mono NL" panose="02000009000000000000" pitchFamily="49" charset="0"/>
               </a:rPr>
             </a:br>
             <a:r>
               <a:rPr lang="en-US" sz="2000" dirty="0">
-                <a:latin typeface="JetBrains Mono NL" panose="02000009000000000000" pitchFamily="49" charset="0"/>
+                <a:latin typeface="Courier" pitchFamily="2" charset="0"/>
                 <a:ea typeface="JetBrains Mono NL" panose="02000009000000000000" pitchFamily="49" charset="0"/>
                 <a:cs typeface="JetBrains Mono NL" panose="02000009000000000000" pitchFamily="49" charset="0"/>
               </a:rPr>
@@ -4054,7 +4052,7 @@
             </a:r>
             <a:r>
               <a:rPr lang="en-US" sz="2000" dirty="0" err="1">
-                <a:latin typeface="JetBrains Mono NL" panose="02000009000000000000" pitchFamily="49" charset="0"/>
+                <a:latin typeface="Courier" pitchFamily="2" charset="0"/>
                 <a:ea typeface="JetBrains Mono NL" panose="02000009000000000000" pitchFamily="49" charset="0"/>
                 <a:cs typeface="JetBrains Mono NL" panose="02000009000000000000" pitchFamily="49" charset="0"/>
               </a:rPr>
@@ -4062,7 +4060,7 @@
             </a:r>
             <a:r>
               <a:rPr lang="en-US" sz="2000" dirty="0">
-                <a:latin typeface="JetBrains Mono NL" panose="02000009000000000000" pitchFamily="49" charset="0"/>
+                <a:latin typeface="Courier" pitchFamily="2" charset="0"/>
                 <a:ea typeface="JetBrains Mono NL" panose="02000009000000000000" pitchFamily="49" charset="0"/>
                 <a:cs typeface="JetBrains Mono NL" panose="02000009000000000000" pitchFamily="49" charset="0"/>
               </a:rPr>
@@ -4123,8 +4121,14 @@
           <a:lstStyle/>
           <a:p>
             <a:r>
-              <a:rPr lang="en-US" dirty="0"/>
-              <a:t>@Nested annotation</a:t>
+              <a:rPr lang="en-US" dirty="0">
+                <a:latin typeface="Courier" pitchFamily="2" charset="0"/>
+              </a:rPr>
+              <a:t>@Nested</a:t>
+            </a:r>
+            <a:r>
+              <a:rPr lang="en-US" dirty="0"/>
+              <a:t> annotation</a:t>
             </a:r>
           </a:p>
         </p:txBody>
@@ -4152,7 +4156,7 @@
           <a:p>
             <a:r>
               <a:rPr lang="en-US" dirty="0"/>
-              <a:t>Using non-static inner classes can facilitate hierarchical thinking about the test structure.</a:t>
+              <a:t>Using non-static inner classes can facilitate hierarchical test structure.</a:t>
             </a:r>
           </a:p>
           <a:p>
@@ -4198,7 +4202,7 @@
             <a:pPr lvl="1"/>
             <a:r>
               <a:rPr lang="en-US" dirty="0"/>
-              <a:t>It will make them infinitely easier to comprehend.</a:t>
+              <a:t>It will make your test suites infinitely easier to comprehend.</a:t>
             </a:r>
           </a:p>
         </p:txBody>
@@ -4255,8 +4259,14 @@
           <a:lstStyle/>
           <a:p>
             <a:r>
-              <a:rPr lang="en-US" dirty="0"/>
-              <a:t>@Test annotation</a:t>
+              <a:rPr lang="en-US" dirty="0">
+                <a:latin typeface="Courier" pitchFamily="2" charset="0"/>
+              </a:rPr>
+              <a:t>@Test</a:t>
+            </a:r>
+            <a:r>
+              <a:rPr lang="en-US" dirty="0"/>
+              <a:t> annotation</a:t>
             </a:r>
           </a:p>
         </p:txBody>
@@ -4284,7 +4294,7 @@
           <a:p>
             <a:r>
               <a:rPr lang="en-US" dirty="0"/>
-              <a:t>Denotes that a method is a test method. </a:t>
+              <a:t>Denotes that a method is an executable test method. </a:t>
             </a:r>
           </a:p>
         </p:txBody>
@@ -4341,11 +4351,15 @@
           <a:lstStyle/>
           <a:p>
             <a:r>
-              <a:rPr lang="en-US" dirty="0"/>
+              <a:rPr lang="en-US" dirty="0">
+                <a:latin typeface="Courier" pitchFamily="2" charset="0"/>
+              </a:rPr>
               <a:t>@</a:t>
             </a:r>
             <a:r>
-              <a:rPr lang="en-US" dirty="0" err="1"/>
+              <a:rPr lang="en-US" dirty="0" err="1">
+                <a:latin typeface="Courier" pitchFamily="2" charset="0"/>
+              </a:rPr>
               <a:t>BeforeEach</a:t>
             </a:r>
             <a:r>
@@ -4378,26 +4392,60 @@
           <a:p>
             <a:r>
               <a:rPr lang="en-US" dirty="0"/>
-              <a:t>Denotes that the annotated method should be executed before each @Test, @</a:t>
-            </a:r>
-            <a:r>
-              <a:rPr lang="en-US" dirty="0" err="1"/>
+              <a:t>Denotes that the annotated method should be executed before each </a:t>
+            </a:r>
+            <a:r>
+              <a:rPr lang="en-US" dirty="0">
+                <a:latin typeface="Courier" pitchFamily="2" charset="0"/>
+              </a:rPr>
+              <a:t>@Test</a:t>
+            </a:r>
+            <a:r>
+              <a:rPr lang="en-US" dirty="0"/>
+              <a:t>, </a:t>
+            </a:r>
+            <a:r>
+              <a:rPr lang="en-US" dirty="0">
+                <a:latin typeface="Courier" pitchFamily="2" charset="0"/>
+              </a:rPr>
+              <a:t>@</a:t>
+            </a:r>
+            <a:r>
+              <a:rPr lang="en-US" dirty="0" err="1">
+                <a:latin typeface="Courier" pitchFamily="2" charset="0"/>
+              </a:rPr>
               <a:t>RepeatedTest</a:t>
             </a:r>
             <a:r>
               <a:rPr lang="en-US" dirty="0"/>
-              <a:t>, @</a:t>
-            </a:r>
-            <a:r>
-              <a:rPr lang="en-US" dirty="0" err="1"/>
+              <a:t>, </a:t>
+            </a:r>
+            <a:r>
+              <a:rPr lang="en-US" dirty="0">
+                <a:latin typeface="Courier" pitchFamily="2" charset="0"/>
+              </a:rPr>
+              <a:t>@</a:t>
+            </a:r>
+            <a:r>
+              <a:rPr lang="en-US" dirty="0" err="1">
+                <a:latin typeface="Courier" pitchFamily="2" charset="0"/>
+              </a:rPr>
               <a:t>ParameterizedTest</a:t>
             </a:r>
             <a:r>
               <a:rPr lang="en-US" dirty="0"/>
-              <a:t>, or @</a:t>
-            </a:r>
-            <a:r>
-              <a:rPr lang="en-US" dirty="0" err="1"/>
+              <a:t>, or </a:t>
+            </a:r>
+            <a:r>
+              <a:rPr lang="en-US" dirty="0">
+                <a:latin typeface="Courier" pitchFamily="2" charset="0"/>
+              </a:rPr>
+              <a:t>@</a:t>
+            </a:r>
+            <a:r>
+              <a:rPr lang="en-US" dirty="0" err="1">
+                <a:latin typeface="Courier" pitchFamily="2" charset="0"/>
+              </a:rPr>
               <a:t>TestFactory</a:t>
             </a:r>
             <a:r>
@@ -4459,11 +4507,15 @@
           <a:lstStyle/>
           <a:p>
             <a:r>
-              <a:rPr lang="en-US" dirty="0"/>
+              <a:rPr lang="en-US" dirty="0">
+                <a:latin typeface="Courier" pitchFamily="2" charset="0"/>
+              </a:rPr>
               <a:t>@</a:t>
             </a:r>
             <a:r>
-              <a:rPr lang="en-US" dirty="0" err="1"/>
+              <a:rPr lang="en-US" dirty="0" err="1">
+                <a:latin typeface="Courier" pitchFamily="2" charset="0"/>
+              </a:rPr>
               <a:t>BeforeAll</a:t>
             </a:r>
             <a:r>
@@ -4496,26 +4548,60 @@
           <a:p>
             <a:r>
               <a:rPr lang="en-US" dirty="0"/>
-              <a:t>Denotes that the annotated method should be executed before all @Test, @</a:t>
-            </a:r>
-            <a:r>
-              <a:rPr lang="en-US" dirty="0" err="1"/>
+              <a:t>Denotes that the annotated method should be executed before all </a:t>
+            </a:r>
+            <a:r>
+              <a:rPr lang="en-US" dirty="0">
+                <a:latin typeface="Courier" pitchFamily="2" charset="0"/>
+              </a:rPr>
+              <a:t>@Test</a:t>
+            </a:r>
+            <a:r>
+              <a:rPr lang="en-US" dirty="0"/>
+              <a:t>, </a:t>
+            </a:r>
+            <a:r>
+              <a:rPr lang="en-US" dirty="0">
+                <a:latin typeface="Courier" pitchFamily="2" charset="0"/>
+              </a:rPr>
+              <a:t>@</a:t>
+            </a:r>
+            <a:r>
+              <a:rPr lang="en-US" dirty="0" err="1">
+                <a:latin typeface="Courier" pitchFamily="2" charset="0"/>
+              </a:rPr>
               <a:t>RepeatedTest</a:t>
             </a:r>
             <a:r>
               <a:rPr lang="en-US" dirty="0"/>
-              <a:t>, @</a:t>
-            </a:r>
-            <a:r>
-              <a:rPr lang="en-US" dirty="0" err="1"/>
+              <a:t>, </a:t>
+            </a:r>
+            <a:r>
+              <a:rPr lang="en-US" dirty="0">
+                <a:latin typeface="Courier" pitchFamily="2" charset="0"/>
+              </a:rPr>
+              <a:t>@</a:t>
+            </a:r>
+            <a:r>
+              <a:rPr lang="en-US" dirty="0" err="1">
+                <a:latin typeface="Courier" pitchFamily="2" charset="0"/>
+              </a:rPr>
               <a:t>ParameterizedTest</a:t>
             </a:r>
             <a:r>
               <a:rPr lang="en-US" dirty="0"/>
-              <a:t>, and @</a:t>
-            </a:r>
-            <a:r>
-              <a:rPr lang="en-US" dirty="0" err="1"/>
+              <a:t>, or </a:t>
+            </a:r>
+            <a:r>
+              <a:rPr lang="en-US" dirty="0">
+                <a:latin typeface="Courier" pitchFamily="2" charset="0"/>
+              </a:rPr>
+              <a:t>@</a:t>
+            </a:r>
+            <a:r>
+              <a:rPr lang="en-US" dirty="0" err="1">
+                <a:latin typeface="Courier" pitchFamily="2" charset="0"/>
+              </a:rPr>
               <a:t>TestFactory</a:t>
             </a:r>
             <a:r>
@@ -4526,7 +4612,24 @@
           <a:p>
             <a:r>
               <a:rPr lang="en-US" dirty="0"/>
-              <a:t>Must be static (unless the "per-class" test instance lifecycle is used).</a:t>
+              <a:t>Must be </a:t>
+            </a:r>
+            <a:r>
+              <a:rPr lang="en-US" b="1" dirty="0">
+                <a:latin typeface="Courier" pitchFamily="2" charset="0"/>
+              </a:rPr>
+              <a:t>static</a:t>
+            </a:r>
+            <a:r>
+              <a:rPr lang="en-US" dirty="0"/>
+              <a:t>.</a:t>
+            </a:r>
+          </a:p>
+          <a:p>
+            <a:pPr lvl="1"/>
+            <a:r>
+              <a:rPr lang="en-US" dirty="0"/>
+              <a:t>Unless the "per-class" test instance lifecycle is used.</a:t>
             </a:r>
           </a:p>
         </p:txBody>
@@ -4583,11 +4686,15 @@
           <a:lstStyle/>
           <a:p>
             <a:r>
-              <a:rPr lang="en-US" dirty="0"/>
+              <a:rPr lang="en-US" dirty="0">
+                <a:latin typeface="Courier" pitchFamily="2" charset="0"/>
+              </a:rPr>
               <a:t>@</a:t>
             </a:r>
             <a:r>
-              <a:rPr lang="en-US" dirty="0" err="1"/>
+              <a:rPr lang="en-US" dirty="0" err="1">
+                <a:latin typeface="Courier" pitchFamily="2" charset="0"/>
+              </a:rPr>
               <a:t>AfterEach</a:t>
             </a:r>
             <a:r>
@@ -4620,26 +4727,60 @@
           <a:p>
             <a:r>
               <a:rPr lang="en-US" dirty="0"/>
-              <a:t>Denotes that the annotated method should be executed after each @Test, @</a:t>
-            </a:r>
-            <a:r>
-              <a:rPr lang="en-US" dirty="0" err="1"/>
+              <a:t>Denotes that the annotated method should be executed after each </a:t>
+            </a:r>
+            <a:r>
+              <a:rPr lang="en-US" dirty="0">
+                <a:latin typeface="Courier" pitchFamily="2" charset="0"/>
+              </a:rPr>
+              <a:t>@Test</a:t>
+            </a:r>
+            <a:r>
+              <a:rPr lang="en-US" dirty="0"/>
+              <a:t>, </a:t>
+            </a:r>
+            <a:r>
+              <a:rPr lang="en-US" dirty="0">
+                <a:latin typeface="Courier" pitchFamily="2" charset="0"/>
+              </a:rPr>
+              <a:t>@</a:t>
+            </a:r>
+            <a:r>
+              <a:rPr lang="en-US" dirty="0" err="1">
+                <a:latin typeface="Courier" pitchFamily="2" charset="0"/>
+              </a:rPr>
               <a:t>RepeatedTest</a:t>
             </a:r>
             <a:r>
               <a:rPr lang="en-US" dirty="0"/>
-              <a:t>, @</a:t>
-            </a:r>
-            <a:r>
-              <a:rPr lang="en-US" dirty="0" err="1"/>
+              <a:t>, </a:t>
+            </a:r>
+            <a:r>
+              <a:rPr lang="en-US" dirty="0">
+                <a:latin typeface="Courier" pitchFamily="2" charset="0"/>
+              </a:rPr>
+              <a:t>@</a:t>
+            </a:r>
+            <a:r>
+              <a:rPr lang="en-US" dirty="0" err="1">
+                <a:latin typeface="Courier" pitchFamily="2" charset="0"/>
+              </a:rPr>
               <a:t>ParameterizedTest</a:t>
             </a:r>
             <a:r>
               <a:rPr lang="en-US" dirty="0"/>
-              <a:t>, or @</a:t>
-            </a:r>
-            <a:r>
-              <a:rPr lang="en-US" dirty="0" err="1"/>
+              <a:t>, or </a:t>
+            </a:r>
+            <a:r>
+              <a:rPr lang="en-US" dirty="0">
+                <a:latin typeface="Courier" pitchFamily="2" charset="0"/>
+              </a:rPr>
+              <a:t>@</a:t>
+            </a:r>
+            <a:r>
+              <a:rPr lang="en-US" dirty="0" err="1">
+                <a:latin typeface="Courier" pitchFamily="2" charset="0"/>
+              </a:rPr>
               <a:t>TestFactory</a:t>
             </a:r>
             <a:r>
@@ -4701,11 +4842,15 @@
           <a:lstStyle/>
           <a:p>
             <a:r>
-              <a:rPr lang="en-US" dirty="0"/>
+              <a:rPr lang="en-US" dirty="0">
+                <a:latin typeface="Courier" pitchFamily="2" charset="0"/>
+              </a:rPr>
               <a:t>@</a:t>
             </a:r>
             <a:r>
-              <a:rPr lang="en-US" dirty="0" err="1"/>
+              <a:rPr lang="en-US" dirty="0" err="1">
+                <a:latin typeface="Courier" pitchFamily="2" charset="0"/>
+              </a:rPr>
               <a:t>AfterAll</a:t>
             </a:r>
             <a:r>
@@ -4738,32 +4883,95 @@
           <a:p>
             <a:r>
               <a:rPr lang="en-US" dirty="0"/>
-              <a:t>Denotes that the annotated method should be executed after all @Test, @</a:t>
-            </a:r>
-            <a:r>
-              <a:rPr lang="en-US" dirty="0" err="1"/>
+              <a:t>Denotes that the annotated method should be executed after all </a:t>
+            </a:r>
+            <a:r>
+              <a:rPr lang="en-US" dirty="0">
+                <a:latin typeface="Courier" pitchFamily="2" charset="0"/>
+              </a:rPr>
+              <a:t>@Test</a:t>
+            </a:r>
+            <a:r>
+              <a:rPr lang="en-US" dirty="0"/>
+              <a:t>, </a:t>
+            </a:r>
+            <a:r>
+              <a:rPr lang="en-US" dirty="0">
+                <a:latin typeface="Courier" pitchFamily="2" charset="0"/>
+              </a:rPr>
+              <a:t>@</a:t>
+            </a:r>
+            <a:r>
+              <a:rPr lang="en-US" dirty="0" err="1">
+                <a:latin typeface="Courier" pitchFamily="2" charset="0"/>
+              </a:rPr>
               <a:t>RepeatedTest</a:t>
             </a:r>
             <a:r>
               <a:rPr lang="en-US" dirty="0"/>
-              <a:t>, @</a:t>
-            </a:r>
-            <a:r>
-              <a:rPr lang="en-US" dirty="0" err="1"/>
+              <a:t>, </a:t>
+            </a:r>
+            <a:r>
+              <a:rPr lang="en-US" dirty="0">
+                <a:latin typeface="Courier" pitchFamily="2" charset="0"/>
+              </a:rPr>
+              <a:t>@</a:t>
+            </a:r>
+            <a:r>
+              <a:rPr lang="en-US" dirty="0" err="1">
+                <a:latin typeface="Courier" pitchFamily="2" charset="0"/>
+              </a:rPr>
               <a:t>ParameterizedTest</a:t>
             </a:r>
             <a:r>
               <a:rPr lang="en-US" dirty="0"/>
-              <a:t>, and @</a:t>
-            </a:r>
-            <a:r>
-              <a:rPr lang="en-US" dirty="0" err="1"/>
+              <a:t>, or </a:t>
+            </a:r>
+            <a:r>
+              <a:rPr lang="en-US" dirty="0">
+                <a:latin typeface="Courier" pitchFamily="2" charset="0"/>
+              </a:rPr>
+              <a:t>@</a:t>
+            </a:r>
+            <a:r>
+              <a:rPr lang="en-US" dirty="0" err="1">
+                <a:latin typeface="Courier" pitchFamily="2" charset="0"/>
+              </a:rPr>
               <a:t>TestFactory</a:t>
             </a:r>
             <a:r>
               <a:rPr lang="en-US" dirty="0"/>
               <a:t> methods in the current class. </a:t>
             </a:r>
+          </a:p>
+          <a:p>
+            <a:r>
+              <a:rPr lang="en-US" dirty="0"/>
+              <a:t>Must be </a:t>
+            </a:r>
+            <a:r>
+              <a:rPr lang="en-US" b="1" dirty="0">
+                <a:latin typeface="Courier" pitchFamily="2" charset="0"/>
+              </a:rPr>
+              <a:t>static</a:t>
+            </a:r>
+            <a:r>
+              <a:rPr lang="en-US" dirty="0"/>
+              <a:t>.</a:t>
+            </a:r>
+          </a:p>
+          <a:p>
+            <a:pPr lvl="1"/>
+            <a:r>
+              <a:rPr lang="en-US" dirty="0"/>
+              <a:t>Unless the "per-class" test instance lifecycle is used.</a:t>
+            </a:r>
+          </a:p>
+          <a:p>
+            <a:pPr marL="0" indent="0">
+              <a:buNone/>
+            </a:pPr>
+            <a:endParaRPr lang="en-US" dirty="0"/>
           </a:p>
         </p:txBody>
       </p:sp>
@@ -4864,7 +5072,7 @@
             </a:r>
             <a:r>
               <a:rPr lang="en-US" dirty="0" err="1">
-                <a:latin typeface="JetBrains Mono NL" panose="02000009000000000000" pitchFamily="49" charset="0"/>
+                <a:latin typeface="Courier" pitchFamily="2" charset="0"/>
                 <a:ea typeface="JetBrains Mono NL" panose="02000009000000000000" pitchFamily="49" charset="0"/>
                 <a:cs typeface="JetBrains Mono NL" panose="02000009000000000000" pitchFamily="49" charset="0"/>
               </a:rPr>
@@ -5107,59 +5315,91 @@
           <a:lstStyle/>
           <a:p>
             <a:r>
-              <a:rPr lang="en-US" dirty="0" err="1"/>
+              <a:rPr lang="en-US" sz="2400" dirty="0" err="1">
+                <a:latin typeface="Courier" pitchFamily="2" charset="0"/>
+              </a:rPr>
               <a:t>assertAll</a:t>
             </a:r>
-            <a:endParaRPr lang="en-US" dirty="0"/>
-          </a:p>
-          <a:p>
-            <a:r>
-              <a:rPr lang="en-US"/>
+            <a:endParaRPr lang="en-US" sz="2400" dirty="0">
+              <a:latin typeface="Courier" pitchFamily="2" charset="0"/>
+            </a:endParaRPr>
+          </a:p>
+          <a:p>
+            <a:r>
+              <a:rPr lang="en-US" sz="2400" dirty="0" err="1">
+                <a:latin typeface="Courier" pitchFamily="2" charset="0"/>
+              </a:rPr>
               <a:t>assertArrayEquals</a:t>
             </a:r>
-            <a:endParaRPr lang="en-US" dirty="0"/>
-          </a:p>
-          <a:p>
-            <a:r>
-              <a:rPr lang="en-US" dirty="0" err="1"/>
+            <a:endParaRPr lang="en-US" sz="2400" dirty="0">
+              <a:latin typeface="Courier" pitchFamily="2" charset="0"/>
+            </a:endParaRPr>
+          </a:p>
+          <a:p>
+            <a:r>
+              <a:rPr lang="en-US" sz="2400" dirty="0" err="1">
+                <a:latin typeface="Courier" pitchFamily="2" charset="0"/>
+              </a:rPr>
               <a:t>assertEquals</a:t>
             </a:r>
-            <a:endParaRPr lang="en-US" dirty="0"/>
-          </a:p>
-          <a:p>
-            <a:r>
-              <a:rPr lang="en-US" dirty="0" err="1"/>
+            <a:endParaRPr lang="en-US" sz="2400" dirty="0">
+              <a:latin typeface="Courier" pitchFamily="2" charset="0"/>
+            </a:endParaRPr>
+          </a:p>
+          <a:p>
+            <a:r>
+              <a:rPr lang="en-US" sz="2400" dirty="0" err="1">
+                <a:latin typeface="Courier" pitchFamily="2" charset="0"/>
+              </a:rPr>
               <a:t>assertNotNull</a:t>
             </a:r>
-            <a:endParaRPr lang="en-US" dirty="0"/>
-          </a:p>
-          <a:p>
-            <a:r>
-              <a:rPr lang="en-US" dirty="0" err="1"/>
+            <a:endParaRPr lang="en-US" sz="2400" dirty="0">
+              <a:latin typeface="Courier" pitchFamily="2" charset="0"/>
+            </a:endParaRPr>
+          </a:p>
+          <a:p>
+            <a:r>
+              <a:rPr lang="en-US" sz="2400" dirty="0" err="1">
+                <a:latin typeface="Courier" pitchFamily="2" charset="0"/>
+              </a:rPr>
               <a:t>assertTimeout</a:t>
             </a:r>
-            <a:endParaRPr lang="en-US" dirty="0"/>
-          </a:p>
-          <a:p>
-            <a:r>
-              <a:rPr lang="en-US" dirty="0" err="1"/>
+            <a:endParaRPr lang="en-US" sz="2400" dirty="0">
+              <a:latin typeface="Courier" pitchFamily="2" charset="0"/>
+            </a:endParaRPr>
+          </a:p>
+          <a:p>
+            <a:r>
+              <a:rPr lang="en-US" sz="2400" dirty="0" err="1">
+                <a:latin typeface="Courier" pitchFamily="2" charset="0"/>
+              </a:rPr>
               <a:t>assertTimeoutPreemptively</a:t>
             </a:r>
-            <a:endParaRPr lang="en-US" dirty="0"/>
-          </a:p>
-          <a:p>
-            <a:r>
-              <a:rPr lang="en-US" dirty="0" err="1"/>
+            <a:endParaRPr lang="en-US" sz="2400" dirty="0">
+              <a:latin typeface="Courier" pitchFamily="2" charset="0"/>
+            </a:endParaRPr>
+          </a:p>
+          <a:p>
+            <a:r>
+              <a:rPr lang="en-US" sz="2400" dirty="0" err="1">
+                <a:latin typeface="Courier" pitchFamily="2" charset="0"/>
+              </a:rPr>
               <a:t>assertTrue</a:t>
             </a:r>
-            <a:endParaRPr lang="en-US" dirty="0"/>
-          </a:p>
-          <a:p>
-            <a:r>
-              <a:rPr lang="en-US" dirty="0" err="1"/>
+            <a:endParaRPr lang="en-US" sz="2400" dirty="0">
+              <a:latin typeface="Courier" pitchFamily="2" charset="0"/>
+            </a:endParaRPr>
+          </a:p>
+          <a:p>
+            <a:r>
+              <a:rPr lang="en-US" sz="2400" dirty="0" err="1">
+                <a:latin typeface="Courier" pitchFamily="2" charset="0"/>
+              </a:rPr>
               <a:t>assertFalse</a:t>
             </a:r>
-            <a:endParaRPr lang="en-US" dirty="0"/>
+            <a:endParaRPr lang="en-US" sz="2400" dirty="0">
+              <a:latin typeface="Courier" pitchFamily="2" charset="0"/>
+            </a:endParaRPr>
           </a:p>
           <a:p>
             <a:endParaRPr lang="en-US" dirty="0"/>
@@ -5190,17 +5430,25 @@
           <a:lstStyle/>
           <a:p>
             <a:r>
-              <a:rPr lang="en-US" dirty="0" err="1"/>
+              <a:rPr lang="en-US" sz="2400" dirty="0" err="1">
+                <a:latin typeface="Courier" pitchFamily="2" charset="0"/>
+              </a:rPr>
               <a:t>assertThrows</a:t>
             </a:r>
-            <a:endParaRPr lang="en-US" dirty="0"/>
-          </a:p>
-          <a:p>
-            <a:r>
-              <a:rPr lang="en-US" dirty="0" err="1"/>
+            <a:endParaRPr lang="en-US" sz="2400" dirty="0">
+              <a:latin typeface="Courier" pitchFamily="2" charset="0"/>
+            </a:endParaRPr>
+          </a:p>
+          <a:p>
+            <a:r>
+              <a:rPr lang="en-US" sz="2400" dirty="0" err="1">
+                <a:latin typeface="Courier" pitchFamily="2" charset="0"/>
+              </a:rPr>
               <a:t>assertDoesNotThrow</a:t>
             </a:r>
-            <a:endParaRPr lang="en-US" dirty="0"/>
+            <a:endParaRPr lang="en-US" sz="2400" dirty="0">
+              <a:latin typeface="Courier" pitchFamily="2" charset="0"/>
+            </a:endParaRPr>
           </a:p>
         </p:txBody>
       </p:sp>
@@ -5408,7 +5656,9 @@
         </p:nvSpPr>
         <p:spPr/>
         <p:txBody>
-          <a:bodyPr/>
+          <a:bodyPr>
+            <a:normAutofit lnSpcReduction="10000"/>
+          </a:bodyPr>
           <a:lstStyle/>
           <a:p>
             <a:r>
@@ -5428,7 +5678,9 @@
               <a:t>All JUnit Jupiter assumptions are static methods in the </a:t>
             </a:r>
             <a:r>
-              <a:rPr lang="en-US" dirty="0" err="1"/>
+              <a:rPr lang="en-US" dirty="0" err="1">
+                <a:latin typeface="Courier" pitchFamily="2" charset="0"/>
+              </a:rPr>
               <a:t>org.junit.jupiter.api.Assumptions</a:t>
             </a:r>
             <a:r>
@@ -5442,7 +5694,9 @@
               <a:t>As of JUnit Jupiter 5.4, it is also possible to use methods from JUnit 4’s </a:t>
             </a:r>
             <a:r>
-              <a:rPr lang="en-US" dirty="0" err="1"/>
+              <a:rPr lang="en-US" dirty="0" err="1">
+                <a:latin typeface="Courier" pitchFamily="2" charset="0"/>
+              </a:rPr>
               <a:t>org.junit.Assume</a:t>
             </a:r>
             <a:r>
@@ -5457,7 +5711,9 @@
               <a:t>Specifically, JUnit Jupiter supports JUnit 4’s </a:t>
             </a:r>
             <a:r>
-              <a:rPr lang="en-US" dirty="0" err="1"/>
+              <a:rPr lang="en-US" dirty="0" err="1">
+                <a:latin typeface="Courier" pitchFamily="2" charset="0"/>
+              </a:rPr>
               <a:t>AssumptionViolatedException</a:t>
             </a:r>
             <a:r>
@@ -5563,7 +5819,7 @@
             </a:r>
             <a:r>
               <a:rPr lang="en-US" dirty="0">
-                <a:latin typeface="JetBrains Mono NL" panose="02000009000000000000" pitchFamily="49" charset="0"/>
+                <a:latin typeface="Courier" pitchFamily="2" charset="0"/>
                 <a:ea typeface="JetBrains Mono NL" panose="02000009000000000000" pitchFamily="49" charset="0"/>
                 <a:cs typeface="JetBrains Mono NL" panose="02000009000000000000" pitchFamily="49" charset="0"/>
               </a:rPr>
@@ -5571,7 +5827,7 @@
             </a:r>
             <a:r>
               <a:rPr lang="en-US" dirty="0" err="1">
-                <a:latin typeface="JetBrains Mono NL" panose="02000009000000000000" pitchFamily="49" charset="0"/>
+                <a:latin typeface="Courier" pitchFamily="2" charset="0"/>
                 <a:ea typeface="JetBrains Mono NL" panose="02000009000000000000" pitchFamily="49" charset="0"/>
                 <a:cs typeface="JetBrains Mono NL" panose="02000009000000000000" pitchFamily="49" charset="0"/>
               </a:rPr>
@@ -5583,7 +5839,7 @@
             </a:r>
             <a:r>
               <a:rPr lang="en-US" dirty="0">
-                <a:latin typeface="JetBrains Mono NL" panose="02000009000000000000" pitchFamily="49" charset="0"/>
+                <a:latin typeface="Courier" pitchFamily="2" charset="0"/>
                 <a:ea typeface="JetBrains Mono NL" panose="02000009000000000000" pitchFamily="49" charset="0"/>
                 <a:cs typeface="JetBrains Mono NL" panose="02000009000000000000" pitchFamily="49" charset="0"/>
               </a:rPr>
@@ -5654,166 +5910,6 @@
           <p:cNvPr id="2" name="Title 1">
             <a:extLst>
               <a:ext uri="{FF2B5EF4-FFF2-40B4-BE49-F238E27FC236}">
-                <a16:creationId xmlns:a16="http://schemas.microsoft.com/office/drawing/2014/main" id="{932B44B2-0D48-2E49-A389-6EB2DB463D69}"/>
-              </a:ext>
-            </a:extLst>
-          </p:cNvPr>
-          <p:cNvSpPr>
-            <a:spLocks noGrp="1"/>
-          </p:cNvSpPr>
-          <p:nvPr>
-            <p:ph type="title"/>
-          </p:nvPr>
-        </p:nvSpPr>
-        <p:spPr/>
-        <p:txBody>
-          <a:bodyPr/>
-          <a:lstStyle/>
-          <a:p>
-            <a:endParaRPr lang="en-US"/>
-          </a:p>
-        </p:txBody>
-      </p:sp>
-      <p:sp>
-        <p:nvSpPr>
-          <p:cNvPr id="3" name="Content Placeholder 2">
-            <a:extLst>
-              <a:ext uri="{FF2B5EF4-FFF2-40B4-BE49-F238E27FC236}">
-                <a16:creationId xmlns:a16="http://schemas.microsoft.com/office/drawing/2014/main" id="{A5729666-EAFA-464D-87EB-A39EF7D69B2F}"/>
-              </a:ext>
-            </a:extLst>
-          </p:cNvPr>
-          <p:cNvSpPr>
-            <a:spLocks noGrp="1"/>
-          </p:cNvSpPr>
-          <p:nvPr>
-            <p:ph idx="1"/>
-          </p:nvPr>
-        </p:nvSpPr>
-        <p:spPr/>
-        <p:txBody>
-          <a:bodyPr/>
-          <a:lstStyle/>
-          <a:p>
-            <a:endParaRPr lang="en-US"/>
-          </a:p>
-        </p:txBody>
-      </p:sp>
-    </p:spTree>
-    <p:extLst>
-      <p:ext uri="{BB962C8B-B14F-4D97-AF65-F5344CB8AC3E}">
-        <p14:creationId xmlns:p14="http://schemas.microsoft.com/office/powerpoint/2010/main" val="3345259123"/>
-      </p:ext>
-    </p:extLst>
-  </p:cSld>
-  <p:clrMapOvr>
-    <a:masterClrMapping/>
-  </p:clrMapOvr>
-</p:sld>
-</file>
-
-<file path=ppt/slides/slide25.xml><?xml version="1.0" encoding="utf-8"?>
-<p:sld xmlns:a="http://schemas.openxmlformats.org/drawingml/2006/main" xmlns:r="http://schemas.openxmlformats.org/officeDocument/2006/relationships" xmlns:p="http://schemas.openxmlformats.org/presentationml/2006/main">
-  <p:cSld>
-    <p:spTree>
-      <p:nvGrpSpPr>
-        <p:cNvPr id="1" name=""/>
-        <p:cNvGrpSpPr/>
-        <p:nvPr/>
-      </p:nvGrpSpPr>
-      <p:grpSpPr>
-        <a:xfrm>
-          <a:off x="0" y="0"/>
-          <a:ext cx="0" cy="0"/>
-          <a:chOff x="0" y="0"/>
-          <a:chExt cx="0" cy="0"/>
-        </a:xfrm>
-      </p:grpSpPr>
-      <p:sp>
-        <p:nvSpPr>
-          <p:cNvPr id="2" name="Title 1">
-            <a:extLst>
-              <a:ext uri="{FF2B5EF4-FFF2-40B4-BE49-F238E27FC236}">
-                <a16:creationId xmlns:a16="http://schemas.microsoft.com/office/drawing/2014/main" id="{BB738B06-D55C-8040-A8A3-FF34FC9D09A0}"/>
-              </a:ext>
-            </a:extLst>
-          </p:cNvPr>
-          <p:cNvSpPr>
-            <a:spLocks noGrp="1"/>
-          </p:cNvSpPr>
-          <p:nvPr>
-            <p:ph type="title"/>
-          </p:nvPr>
-        </p:nvSpPr>
-        <p:spPr/>
-        <p:txBody>
-          <a:bodyPr/>
-          <a:lstStyle/>
-          <a:p>
-            <a:endParaRPr lang="en-US"/>
-          </a:p>
-        </p:txBody>
-      </p:sp>
-      <p:sp>
-        <p:nvSpPr>
-          <p:cNvPr id="3" name="Content Placeholder 2">
-            <a:extLst>
-              <a:ext uri="{FF2B5EF4-FFF2-40B4-BE49-F238E27FC236}">
-                <a16:creationId xmlns:a16="http://schemas.microsoft.com/office/drawing/2014/main" id="{58FE2181-742A-6840-A441-36C8269E98DD}"/>
-              </a:ext>
-            </a:extLst>
-          </p:cNvPr>
-          <p:cNvSpPr>
-            <a:spLocks noGrp="1"/>
-          </p:cNvSpPr>
-          <p:nvPr>
-            <p:ph idx="1"/>
-          </p:nvPr>
-        </p:nvSpPr>
-        <p:spPr/>
-        <p:txBody>
-          <a:bodyPr/>
-          <a:lstStyle/>
-          <a:p>
-            <a:endParaRPr lang="en-US"/>
-          </a:p>
-        </p:txBody>
-      </p:sp>
-    </p:spTree>
-    <p:extLst>
-      <p:ext uri="{BB962C8B-B14F-4D97-AF65-F5344CB8AC3E}">
-        <p14:creationId xmlns:p14="http://schemas.microsoft.com/office/powerpoint/2010/main" val="607961200"/>
-      </p:ext>
-    </p:extLst>
-  </p:cSld>
-  <p:clrMapOvr>
-    <a:masterClrMapping/>
-  </p:clrMapOvr>
-</p:sld>
-</file>
-
-<file path=ppt/slides/slide26.xml><?xml version="1.0" encoding="utf-8"?>
-<p:sld xmlns:a="http://schemas.openxmlformats.org/drawingml/2006/main" xmlns:r="http://schemas.openxmlformats.org/officeDocument/2006/relationships" xmlns:p="http://schemas.openxmlformats.org/presentationml/2006/main">
-  <p:cSld>
-    <p:spTree>
-      <p:nvGrpSpPr>
-        <p:cNvPr id="1" name=""/>
-        <p:cNvGrpSpPr/>
-        <p:nvPr/>
-      </p:nvGrpSpPr>
-      <p:grpSpPr>
-        <a:xfrm>
-          <a:off x="0" y="0"/>
-          <a:ext cx="0" cy="0"/>
-          <a:chOff x="0" y="0"/>
-          <a:chExt cx="0" cy="0"/>
-        </a:xfrm>
-      </p:grpSpPr>
-      <p:sp>
-        <p:nvSpPr>
-          <p:cNvPr id="2" name="Title 1">
-            <a:extLst>
-              <a:ext uri="{FF2B5EF4-FFF2-40B4-BE49-F238E27FC236}">
                 <a16:creationId xmlns:a16="http://schemas.microsoft.com/office/drawing/2014/main" id="{EF948449-51E6-9148-82F6-455F26533FA8}"/>
               </a:ext>
             </a:extLst>
@@ -5992,19 +6088,34 @@
         <p:spPr/>
         <p:txBody>
           <a:bodyPr>
-            <a:normAutofit/>
+            <a:normAutofit fontScale="92500" lnSpcReduction="10000"/>
           </a:bodyPr>
           <a:lstStyle/>
           <a:p>
             <a:r>
               <a:rPr lang="en-US" dirty="0"/>
-              <a:t>Provides a foundation for launching testing frameworks on the JVM. </a:t>
-            </a:r>
-          </a:p>
-          <a:p>
-            <a:r>
-              <a:rPr lang="en-US" dirty="0"/>
-              <a:t>Provides the </a:t>
+              <a:t>Provides the following functionality:</a:t>
+            </a:r>
+          </a:p>
+          <a:p>
+            <a:pPr lvl="1"/>
+            <a:r>
+              <a:rPr lang="en-US" dirty="0"/>
+              <a:t>Foundation for launching testing frameworks on the JVM. </a:t>
+            </a:r>
+          </a:p>
+          <a:p>
+            <a:pPr lvl="1"/>
+            <a:r>
+              <a:rPr lang="en-US" dirty="0"/>
+              <a:t>An interface between JUnit and build tools and IDEs. </a:t>
+            </a:r>
+          </a:p>
+          <a:p>
+            <a:pPr lvl="1"/>
+            <a:r>
+              <a:rPr lang="en-US" dirty="0"/>
+              <a:t>The </a:t>
             </a:r>
             <a:r>
               <a:rPr lang="en-US" dirty="0" err="1">
@@ -6014,10 +6125,53 @@
             </a:r>
             <a:r>
               <a:rPr lang="en-US" dirty="0"/>
-              <a:t> API for developing a testing framework that runs on the platform. </a:t>
-            </a:r>
-          </a:p>
-          <a:p>
+              <a:t> API for developing a testing framework that runs on the JUnit platform. </a:t>
+            </a:r>
+          </a:p>
+          <a:p>
+            <a:pPr lvl="1"/>
+            <a:r>
+              <a:rPr lang="en-US" dirty="0"/>
+              <a:t>Using the </a:t>
+            </a:r>
+            <a:r>
+              <a:rPr lang="en-US" dirty="0" err="1">
+                <a:latin typeface="Courier" pitchFamily="2" charset="0"/>
+              </a:rPr>
+              <a:t>TestEngine</a:t>
+            </a:r>
+            <a:r>
+              <a:rPr lang="en-US" dirty="0"/>
+              <a:t> API, third-party testing libraries such as Spock, Cucumber, and </a:t>
+            </a:r>
+            <a:r>
+              <a:rPr lang="en-US" dirty="0" err="1"/>
+              <a:t>FitNesse</a:t>
+            </a:r>
+            <a:r>
+              <a:rPr lang="en-US" dirty="0"/>
+              <a:t> can directly plug in and provide their custom </a:t>
+            </a:r>
+            <a:r>
+              <a:rPr lang="en-US" dirty="0" err="1">
+                <a:latin typeface="Courier" pitchFamily="2" charset="0"/>
+              </a:rPr>
+              <a:t>TestEngine</a:t>
+            </a:r>
+            <a:r>
+              <a:rPr lang="en-US" dirty="0"/>
+              <a:t> implementation.</a:t>
+            </a:r>
+          </a:p>
+          <a:p>
+            <a:pPr lvl="1"/>
+            <a:r>
+              <a:rPr lang="en-US" dirty="0"/>
+              <a:t>The concept of a Launcher which external tools use to discover, filter, and execute tests. </a:t>
+            </a:r>
+          </a:p>
+          <a:p>
+            <a:pPr lvl="2"/>
             <a:r>
               <a:rPr lang="en-US" dirty="0"/>
               <a:t>Provides a </a:t>
@@ -6034,6 +6188,7 @@
             </a:r>
           </a:p>
           <a:p>
+            <a:pPr lvl="1"/>
             <a:r>
               <a:rPr lang="en-US" dirty="0"/>
               <a:t>Provides a JUnit 4-based </a:t>
@@ -6142,21 +6297,31 @@
           <a:p>
             <a:r>
               <a:rPr lang="en-US" dirty="0"/>
-              <a:t>Provides a new programming model and extension model for writing tests and extensions in JUnit 5. </a:t>
-            </a:r>
-          </a:p>
-          <a:p>
-            <a:r>
-              <a:rPr lang="en-US" dirty="0"/>
-              <a:t>Provides a </a:t>
-            </a:r>
-            <a:r>
-              <a:rPr lang="en-US" dirty="0" err="1"/>
+              <a:t>Provides the following functionality: </a:t>
+            </a:r>
+          </a:p>
+          <a:p>
+            <a:pPr lvl="1"/>
+            <a:r>
+              <a:rPr lang="en-US" dirty="0"/>
+              <a:t>A new programming model and extension model for writing tests and extensions in JUnit 5. </a:t>
+            </a:r>
+          </a:p>
+          <a:p>
+            <a:pPr lvl="1"/>
+            <a:r>
+              <a:rPr lang="en-US" dirty="0"/>
+              <a:t>A </a:t>
+            </a:r>
+            <a:r>
+              <a:rPr lang="en-US" dirty="0" err="1">
+                <a:latin typeface="Courier" pitchFamily="2" charset="0"/>
+              </a:rPr>
               <a:t>TestEngine</a:t>
             </a:r>
             <a:r>
               <a:rPr lang="en-US" dirty="0"/>
-              <a:t> for running Jupiter based tests on the platform.</a:t>
+              <a:t> implementation for running Jupiter based tests on the JUnit 5 Platform.</a:t>
             </a:r>
           </a:p>
           <a:p>
@@ -6169,7 +6334,7 @@
             <a:pPr lvl="1"/>
             <a:r>
               <a:rPr lang="en-US" dirty="0"/>
-              <a:t>JUnit Jupiter allows us to write much more flexible unit tests with JUnit than in previous versions of the library.</a:t>
+              <a:t>JUnit Jupiter allows us to write much more flexible unit tests than previous versions of JUnit.</a:t>
             </a:r>
           </a:p>
         </p:txBody>
@@ -6385,10 +6550,22 @@
           <a:p>
             <a:r>
               <a:rPr lang="en-US" dirty="0"/>
-              <a:t>Overcomes the limitations of competing JUnit 4’s extension points (Runner, </a:t>
-            </a:r>
-            <a:r>
-              <a:rPr lang="en-US" dirty="0" err="1"/>
+              <a:t>Overcomes the limitations of competing JUnit 4’s extension points (</a:t>
+            </a:r>
+            <a:r>
+              <a:rPr lang="en-US" dirty="0">
+                <a:latin typeface="Courier" pitchFamily="2" charset="0"/>
+              </a:rPr>
+              <a:t>Runner</a:t>
+            </a:r>
+            <a:r>
+              <a:rPr lang="en-US" dirty="0"/>
+              <a:t>, </a:t>
+            </a:r>
+            <a:r>
+              <a:rPr lang="en-US" dirty="0" err="1">
+                <a:latin typeface="Courier" pitchFamily="2" charset="0"/>
+              </a:rPr>
               <a:t>TestRule</a:t>
             </a:r>
             <a:r>
@@ -6396,7 +6573,9 @@
               <a:t>, </a:t>
             </a:r>
             <a:r>
-              <a:rPr lang="en-US" dirty="0" err="1"/>
+              <a:rPr lang="en-US" dirty="0" err="1">
+                <a:latin typeface="Courier" pitchFamily="2" charset="0"/>
+              </a:rPr>
               <a:t>MethodRule</a:t>
             </a:r>
             <a:r>
@@ -6459,7 +6638,7 @@
           <a:p>
             <a:r>
               <a:rPr lang="en-US" dirty="0">
-                <a:latin typeface="JetBrains Mono NL" panose="02000009000000000000" pitchFamily="49" charset="0"/>
+                <a:latin typeface="Courier" pitchFamily="2" charset="0"/>
                 <a:ea typeface="JetBrains Mono NL" panose="02000009000000000000" pitchFamily="49" charset="0"/>
                 <a:cs typeface="JetBrains Mono NL" panose="02000009000000000000" pitchFamily="49" charset="0"/>
               </a:rPr>
@@ -6467,7 +6646,7 @@
             </a:r>
             <a:r>
               <a:rPr lang="en-US" dirty="0" err="1">
-                <a:latin typeface="JetBrains Mono NL" panose="02000009000000000000" pitchFamily="49" charset="0"/>
+                <a:latin typeface="Courier" pitchFamily="2" charset="0"/>
                 <a:ea typeface="JetBrains Mono NL" panose="02000009000000000000" pitchFamily="49" charset="0"/>
                 <a:cs typeface="JetBrains Mono NL" panose="02000009000000000000" pitchFamily="49" charset="0"/>
               </a:rPr>
@@ -6510,18 +6689,48 @@
             <a:pPr lvl="1"/>
             <a:r>
               <a:rPr lang="en-US" dirty="0"/>
-              <a:t>Multiple extensions can be specified by adding the @</a:t>
-            </a:r>
-            <a:r>
-              <a:rPr lang="en-US" dirty="0" err="1"/>
+              <a:t>Multiple extensions can be specified. </a:t>
+            </a:r>
+          </a:p>
+          <a:p>
+            <a:pPr lvl="2"/>
+            <a:r>
+              <a:rPr lang="en-US" dirty="0"/>
+              <a:t>Adding the </a:t>
+            </a:r>
+            <a:r>
+              <a:rPr lang="en-US" dirty="0">
+                <a:latin typeface="Courier" pitchFamily="2" charset="0"/>
+              </a:rPr>
+              <a:t>@</a:t>
+            </a:r>
+            <a:r>
+              <a:rPr lang="en-US" dirty="0" err="1">
+                <a:latin typeface="Courier" pitchFamily="2" charset="0"/>
+              </a:rPr>
               <a:t>ExtendWith</a:t>
             </a:r>
             <a:r>
               <a:rPr lang="en-US" dirty="0"/>
-              <a:t> annotation multiple time to a test, or having a single @</a:t>
-            </a:r>
-            <a:r>
-              <a:rPr lang="en-US" dirty="0" err="1"/>
+              <a:t> annotation multiple time to a test. </a:t>
+            </a:r>
+          </a:p>
+          <a:p>
+            <a:pPr lvl="2"/>
+            <a:r>
+              <a:rPr lang="en-US" dirty="0"/>
+              <a:t>Single </a:t>
+            </a:r>
+            <a:r>
+              <a:rPr lang="en-US" dirty="0">
+                <a:latin typeface="Courier" pitchFamily="2" charset="0"/>
+              </a:rPr>
+              <a:t>@</a:t>
+            </a:r>
+            <a:r>
+              <a:rPr lang="en-US" dirty="0" err="1">
+                <a:latin typeface="Courier" pitchFamily="2" charset="0"/>
+              </a:rPr>
               <a:t>ExtendWith</a:t>
             </a:r>
             <a:r>
@@ -6567,7 +6776,7 @@
             </a:r>
             <a:r>
               <a:rPr lang="en-US" dirty="0">
-                <a:latin typeface="JetBrains Mono NL" panose="02000009000000000000" pitchFamily="49" charset="0"/>
+                <a:latin typeface="Courier" pitchFamily="2" charset="0"/>
                 <a:ea typeface="JetBrains Mono NL" panose="02000009000000000000" pitchFamily="49" charset="0"/>
                 <a:cs typeface="JetBrains Mono NL" panose="02000009000000000000" pitchFamily="49" charset="0"/>
               </a:rPr>
@@ -6575,7 +6784,7 @@
             </a:r>
             <a:r>
               <a:rPr lang="en-US" dirty="0" err="1">
-                <a:latin typeface="JetBrains Mono NL" panose="02000009000000000000" pitchFamily="49" charset="0"/>
+                <a:latin typeface="Courier" pitchFamily="2" charset="0"/>
                 <a:ea typeface="JetBrains Mono NL" panose="02000009000000000000" pitchFamily="49" charset="0"/>
                 <a:cs typeface="JetBrains Mono NL" panose="02000009000000000000" pitchFamily="49" charset="0"/>
               </a:rPr>
@@ -6647,14 +6856,21 @@
           <a:lstStyle/>
           <a:p>
             <a:r>
-              <a:rPr lang="en-US" dirty="0"/>
-              <a:t>Using @</a:t>
-            </a:r>
-            <a:r>
-              <a:rPr lang="en-US" dirty="0" err="1"/>
+              <a:rPr lang="en-US" dirty="0">
+                <a:latin typeface="Courier" pitchFamily="2" charset="0"/>
+              </a:rPr>
+              <a:t>@</a:t>
+            </a:r>
+            <a:r>
+              <a:rPr lang="en-US" dirty="0" err="1">
+                <a:latin typeface="Courier" pitchFamily="2" charset="0"/>
+              </a:rPr>
               <a:t>ExtendWith</a:t>
             </a:r>
-            <a:endParaRPr lang="en-US" dirty="0"/>
+            <a:r>
+              <a:rPr lang="en-US" dirty="0"/>
+              <a:t> example</a:t>
+            </a:r>
           </a:p>
         </p:txBody>
       </p:sp>
@@ -6685,7 +6901,12 @@
               <a:buNone/>
             </a:pPr>
             <a:r>
-              <a:rPr lang="en-US" sz="2000" dirty="0">
+              <a:rPr lang="en-US" b="1" dirty="0">
+                <a:solidFill>
+                  <a:schemeClr val="accent5">
+                    <a:lumMod val="50000"/>
+                  </a:schemeClr>
+                </a:solidFill>
                 <a:latin typeface="JetBrains Mono NL" panose="02000009000000000000" pitchFamily="49" charset="0"/>
                 <a:ea typeface="JetBrains Mono NL" panose="02000009000000000000" pitchFamily="49" charset="0"/>
                 <a:cs typeface="JetBrains Mono NL" panose="02000009000000000000" pitchFamily="49" charset="0"/>
@@ -6693,7 +6914,12 @@
               <a:t>@</a:t>
             </a:r>
             <a:r>
-              <a:rPr lang="en-US" sz="2000" dirty="0" err="1">
+              <a:rPr lang="en-US" b="1" dirty="0" err="1">
+                <a:solidFill>
+                  <a:schemeClr val="accent5">
+                    <a:lumMod val="50000"/>
+                  </a:schemeClr>
+                </a:solidFill>
                 <a:latin typeface="JetBrains Mono NL" panose="02000009000000000000" pitchFamily="49" charset="0"/>
                 <a:ea typeface="JetBrains Mono NL" panose="02000009000000000000" pitchFamily="49" charset="0"/>
                 <a:cs typeface="JetBrains Mono NL" panose="02000009000000000000" pitchFamily="49" charset="0"/>
@@ -6701,7 +6927,7 @@
               <a:t>ExtendWith</a:t>
             </a:r>
             <a:r>
-              <a:rPr lang="en-US" sz="2000" dirty="0">
+              <a:rPr lang="en-US" dirty="0">
                 <a:latin typeface="JetBrains Mono NL" panose="02000009000000000000" pitchFamily="49" charset="0"/>
                 <a:ea typeface="JetBrains Mono NL" panose="02000009000000000000" pitchFamily="49" charset="0"/>
                 <a:cs typeface="JetBrains Mono NL" panose="02000009000000000000" pitchFamily="49" charset="0"/>
@@ -6709,7 +6935,7 @@
               <a:t>({ </a:t>
             </a:r>
             <a:r>
-              <a:rPr lang="en-US" sz="2000" dirty="0" err="1">
+              <a:rPr lang="en-US" dirty="0" err="1">
                 <a:latin typeface="JetBrains Mono NL" panose="02000009000000000000" pitchFamily="49" charset="0"/>
                 <a:ea typeface="JetBrains Mono NL" panose="02000009000000000000" pitchFamily="49" charset="0"/>
                 <a:cs typeface="JetBrains Mono NL" panose="02000009000000000000" pitchFamily="49" charset="0"/>
@@ -6717,55 +6943,110 @@
               <a:t>EnvironmentExtension.class</a:t>
             </a:r>
             <a:r>
-              <a:rPr lang="en-US" sz="2000" dirty="0">
+              <a:rPr lang="en-US" dirty="0">
                 <a:latin typeface="JetBrains Mono NL" panose="02000009000000000000" pitchFamily="49" charset="0"/>
                 <a:ea typeface="JetBrains Mono NL" panose="02000009000000000000" pitchFamily="49" charset="0"/>
                 <a:cs typeface="JetBrains Mono NL" panose="02000009000000000000" pitchFamily="49" charset="0"/>
               </a:rPr>
               <a:t>, 	</a:t>
             </a:r>
-            <a:r>
-              <a:rPr lang="en-US" sz="2000" dirty="0" err="1">
+            <a:br>
+              <a:rPr lang="en-US" dirty="0">
                 <a:latin typeface="JetBrains Mono NL" panose="02000009000000000000" pitchFamily="49" charset="0"/>
                 <a:ea typeface="JetBrains Mono NL" panose="02000009000000000000" pitchFamily="49" charset="0"/>
                 <a:cs typeface="JetBrains Mono NL" panose="02000009000000000000" pitchFamily="49" charset="0"/>
               </a:rPr>
+            </a:br>
+            <a:r>
+              <a:rPr lang="en-US" dirty="0">
+                <a:latin typeface="JetBrains Mono NL" panose="02000009000000000000" pitchFamily="49" charset="0"/>
+                <a:ea typeface="JetBrains Mono NL" panose="02000009000000000000" pitchFamily="49" charset="0"/>
+                <a:cs typeface="JetBrains Mono NL" panose="02000009000000000000" pitchFamily="49" charset="0"/>
+              </a:rPr>
+              <a:t>                             </a:t>
+            </a:r>
+            <a:r>
+              <a:rPr lang="en-US" dirty="0" err="1">
+                <a:latin typeface="JetBrains Mono NL" panose="02000009000000000000" pitchFamily="49" charset="0"/>
+                <a:ea typeface="JetBrains Mono NL" panose="02000009000000000000" pitchFamily="49" charset="0"/>
+                <a:cs typeface="JetBrains Mono NL" panose="02000009000000000000" pitchFamily="49" charset="0"/>
+              </a:rPr>
               <a:t>EmployeeDatabaseSetupExtension.class</a:t>
             </a:r>
             <a:r>
-              <a:rPr lang="en-US" sz="2000" dirty="0">
+              <a:rPr lang="en-US" dirty="0">
                 <a:latin typeface="JetBrains Mono NL" panose="02000009000000000000" pitchFamily="49" charset="0"/>
                 <a:ea typeface="JetBrains Mono NL" panose="02000009000000000000" pitchFamily="49" charset="0"/>
                 <a:cs typeface="JetBrains Mono NL" panose="02000009000000000000" pitchFamily="49" charset="0"/>
               </a:rPr>
               <a:t>, 	</a:t>
             </a:r>
-            <a:r>
-              <a:rPr lang="en-US" sz="2000" dirty="0" err="1">
+            <a:br>
+              <a:rPr lang="en-US" dirty="0">
                 <a:latin typeface="JetBrains Mono NL" panose="02000009000000000000" pitchFamily="49" charset="0"/>
                 <a:ea typeface="JetBrains Mono NL" panose="02000009000000000000" pitchFamily="49" charset="0"/>
                 <a:cs typeface="JetBrains Mono NL" panose="02000009000000000000" pitchFamily="49" charset="0"/>
               </a:rPr>
+            </a:br>
+            <a:r>
+              <a:rPr lang="en-US" dirty="0">
+                <a:latin typeface="JetBrains Mono NL" panose="02000009000000000000" pitchFamily="49" charset="0"/>
+                <a:ea typeface="JetBrains Mono NL" panose="02000009000000000000" pitchFamily="49" charset="0"/>
+                <a:cs typeface="JetBrains Mono NL" panose="02000009000000000000" pitchFamily="49" charset="0"/>
+              </a:rPr>
+              <a:t>                             </a:t>
+            </a:r>
+            <a:r>
+              <a:rPr lang="en-US" dirty="0" err="1">
+                <a:latin typeface="JetBrains Mono NL" panose="02000009000000000000" pitchFamily="49" charset="0"/>
+                <a:ea typeface="JetBrains Mono NL" panose="02000009000000000000" pitchFamily="49" charset="0"/>
+                <a:cs typeface="JetBrains Mono NL" panose="02000009000000000000" pitchFamily="49" charset="0"/>
+              </a:rPr>
               <a:t>EmployeeDaoParameterResolver.class</a:t>
             </a:r>
             <a:r>
-              <a:rPr lang="en-US" sz="2000" dirty="0">
+              <a:rPr lang="en-US" dirty="0">
                 <a:latin typeface="JetBrains Mono NL" panose="02000009000000000000" pitchFamily="49" charset="0"/>
                 <a:ea typeface="JetBrains Mono NL" panose="02000009000000000000" pitchFamily="49" charset="0"/>
                 <a:cs typeface="JetBrains Mono NL" panose="02000009000000000000" pitchFamily="49" charset="0"/>
               </a:rPr>
-              <a:t> }) @</a:t>
-            </a:r>
-            <a:r>
-              <a:rPr lang="en-US" sz="2000" dirty="0" err="1">
+              <a:t> }) </a:t>
+            </a:r>
+            <a:br>
+              <a:rPr lang="en-US" dirty="0">
                 <a:latin typeface="JetBrains Mono NL" panose="02000009000000000000" pitchFamily="49" charset="0"/>
                 <a:ea typeface="JetBrains Mono NL" panose="02000009000000000000" pitchFamily="49" charset="0"/>
                 <a:cs typeface="JetBrains Mono NL" panose="02000009000000000000" pitchFamily="49" charset="0"/>
               </a:rPr>
+            </a:br>
+            <a:r>
+              <a:rPr lang="en-US" b="1" dirty="0">
+                <a:solidFill>
+                  <a:schemeClr val="accent5">
+                    <a:lumMod val="50000"/>
+                  </a:schemeClr>
+                </a:solidFill>
+                <a:latin typeface="JetBrains Mono NL" panose="02000009000000000000" pitchFamily="49" charset="0"/>
+                <a:ea typeface="JetBrains Mono NL" panose="02000009000000000000" pitchFamily="49" charset="0"/>
+                <a:cs typeface="JetBrains Mono NL" panose="02000009000000000000" pitchFamily="49" charset="0"/>
+              </a:rPr>
+              <a:t>@</a:t>
+            </a:r>
+            <a:r>
+              <a:rPr lang="en-US" b="1" dirty="0" err="1">
+                <a:solidFill>
+                  <a:schemeClr val="accent5">
+                    <a:lumMod val="50000"/>
+                  </a:schemeClr>
+                </a:solidFill>
+                <a:latin typeface="JetBrains Mono NL" panose="02000009000000000000" pitchFamily="49" charset="0"/>
+                <a:ea typeface="JetBrains Mono NL" panose="02000009000000000000" pitchFamily="49" charset="0"/>
+                <a:cs typeface="JetBrains Mono NL" panose="02000009000000000000" pitchFamily="49" charset="0"/>
+              </a:rPr>
               <a:t>ExtendWith</a:t>
             </a:r>
             <a:r>
-              <a:rPr lang="en-US" sz="2000" dirty="0">
+              <a:rPr lang="en-US" dirty="0">
                 <a:latin typeface="JetBrains Mono NL" panose="02000009000000000000" pitchFamily="49" charset="0"/>
                 <a:ea typeface="JetBrains Mono NL" panose="02000009000000000000" pitchFamily="49" charset="0"/>
                 <a:cs typeface="JetBrains Mono NL" panose="02000009000000000000" pitchFamily="49" charset="0"/>
@@ -6773,7 +7054,7 @@
               <a:t>(</a:t>
             </a:r>
             <a:r>
-              <a:rPr lang="en-US" sz="2000" dirty="0" err="1">
+              <a:rPr lang="en-US" dirty="0" err="1">
                 <a:latin typeface="JetBrains Mono NL" panose="02000009000000000000" pitchFamily="49" charset="0"/>
                 <a:ea typeface="JetBrains Mono NL" panose="02000009000000000000" pitchFamily="49" charset="0"/>
                 <a:cs typeface="JetBrains Mono NL" panose="02000009000000000000" pitchFamily="49" charset="0"/>
@@ -6781,23 +7062,48 @@
               <a:t>LoggingExtension.class</a:t>
             </a:r>
             <a:r>
-              <a:rPr lang="en-US" sz="2000" dirty="0">
+              <a:rPr lang="en-US" dirty="0">
                 <a:latin typeface="JetBrains Mono NL" panose="02000009000000000000" pitchFamily="49" charset="0"/>
                 <a:ea typeface="JetBrains Mono NL" panose="02000009000000000000" pitchFamily="49" charset="0"/>
                 <a:cs typeface="JetBrains Mono NL" panose="02000009000000000000" pitchFamily="49" charset="0"/>
               </a:rPr>
-              <a:t>) @</a:t>
-            </a:r>
-            <a:r>
-              <a:rPr lang="en-US" sz="2000" dirty="0" err="1">
+              <a:t>) </a:t>
+            </a:r>
+            <a:br>
+              <a:rPr lang="en-US" dirty="0">
                 <a:latin typeface="JetBrains Mono NL" panose="02000009000000000000" pitchFamily="49" charset="0"/>
                 <a:ea typeface="JetBrains Mono NL" panose="02000009000000000000" pitchFamily="49" charset="0"/>
                 <a:cs typeface="JetBrains Mono NL" panose="02000009000000000000" pitchFamily="49" charset="0"/>
               </a:rPr>
+            </a:br>
+            <a:r>
+              <a:rPr lang="en-US" b="1" dirty="0">
+                <a:solidFill>
+                  <a:schemeClr val="accent5">
+                    <a:lumMod val="50000"/>
+                  </a:schemeClr>
+                </a:solidFill>
+                <a:latin typeface="JetBrains Mono NL" panose="02000009000000000000" pitchFamily="49" charset="0"/>
+                <a:ea typeface="JetBrains Mono NL" panose="02000009000000000000" pitchFamily="49" charset="0"/>
+                <a:cs typeface="JetBrains Mono NL" panose="02000009000000000000" pitchFamily="49" charset="0"/>
+              </a:rPr>
+              <a:t>@</a:t>
+            </a:r>
+            <a:r>
+              <a:rPr lang="en-US" b="1" dirty="0" err="1">
+                <a:solidFill>
+                  <a:schemeClr val="accent5">
+                    <a:lumMod val="50000"/>
+                  </a:schemeClr>
+                </a:solidFill>
+                <a:latin typeface="JetBrains Mono NL" panose="02000009000000000000" pitchFamily="49" charset="0"/>
+                <a:ea typeface="JetBrains Mono NL" panose="02000009000000000000" pitchFamily="49" charset="0"/>
+                <a:cs typeface="JetBrains Mono NL" panose="02000009000000000000" pitchFamily="49" charset="0"/>
+              </a:rPr>
               <a:t>ExtendWith</a:t>
             </a:r>
             <a:r>
-              <a:rPr lang="en-US" sz="2000" dirty="0">
+              <a:rPr lang="en-US" dirty="0">
                 <a:latin typeface="JetBrains Mono NL" panose="02000009000000000000" pitchFamily="49" charset="0"/>
                 <a:ea typeface="JetBrains Mono NL" panose="02000009000000000000" pitchFamily="49" charset="0"/>
                 <a:cs typeface="JetBrains Mono NL" panose="02000009000000000000" pitchFamily="49" charset="0"/>
@@ -6805,7 +7111,7 @@
               <a:t>(</a:t>
             </a:r>
             <a:r>
-              <a:rPr lang="en-US" sz="2000" dirty="0" err="1">
+              <a:rPr lang="en-US" dirty="0" err="1">
                 <a:latin typeface="JetBrains Mono NL" panose="02000009000000000000" pitchFamily="49" charset="0"/>
                 <a:ea typeface="JetBrains Mono NL" panose="02000009000000000000" pitchFamily="49" charset="0"/>
                 <a:cs typeface="JetBrains Mono NL" panose="02000009000000000000" pitchFamily="49" charset="0"/>
@@ -6813,7 +7119,7 @@
               <a:t>IgnoreFileNotFoundExceptionExtension.class</a:t>
             </a:r>
             <a:r>
-              <a:rPr lang="en-US" sz="2000" dirty="0">
+              <a:rPr lang="en-US" dirty="0">
                 <a:latin typeface="JetBrains Mono NL" panose="02000009000000000000" pitchFamily="49" charset="0"/>
                 <a:ea typeface="JetBrains Mono NL" panose="02000009000000000000" pitchFamily="49" charset="0"/>
                 <a:cs typeface="JetBrains Mono NL" panose="02000009000000000000" pitchFamily="49" charset="0"/>
@@ -6821,14 +7127,14 @@
               <a:t>) </a:t>
             </a:r>
             <a:br>
-              <a:rPr lang="en-US" sz="2000" dirty="0">
+              <a:rPr lang="en-US" dirty="0">
                 <a:latin typeface="JetBrains Mono NL" panose="02000009000000000000" pitchFamily="49" charset="0"/>
                 <a:ea typeface="JetBrains Mono NL" panose="02000009000000000000" pitchFamily="49" charset="0"/>
                 <a:cs typeface="JetBrains Mono NL" panose="02000009000000000000" pitchFamily="49" charset="0"/>
               </a:rPr>
             </a:br>
             <a:r>
-              <a:rPr lang="en-US" sz="2000" b="1" dirty="0">
+              <a:rPr lang="en-US" b="1" dirty="0">
                 <a:latin typeface="JetBrains Mono NL" panose="02000009000000000000" pitchFamily="49" charset="0"/>
                 <a:ea typeface="JetBrains Mono NL" panose="02000009000000000000" pitchFamily="49" charset="0"/>
                 <a:cs typeface="JetBrains Mono NL" panose="02000009000000000000" pitchFamily="49" charset="0"/>
@@ -6836,7 +7142,7 @@
               <a:t>public</a:t>
             </a:r>
             <a:r>
-              <a:rPr lang="en-US" sz="2000" dirty="0">
+              <a:rPr lang="en-US" dirty="0">
                 <a:latin typeface="JetBrains Mono NL" panose="02000009000000000000" pitchFamily="49" charset="0"/>
                 <a:ea typeface="JetBrains Mono NL" panose="02000009000000000000" pitchFamily="49" charset="0"/>
                 <a:cs typeface="JetBrains Mono NL" panose="02000009000000000000" pitchFamily="49" charset="0"/>
@@ -6844,7 +7150,7 @@
               <a:t> </a:t>
             </a:r>
             <a:r>
-              <a:rPr lang="en-US" sz="2000" b="1" dirty="0">
+              <a:rPr lang="en-US" b="1" dirty="0">
                 <a:latin typeface="JetBrains Mono NL" panose="02000009000000000000" pitchFamily="49" charset="0"/>
                 <a:ea typeface="JetBrains Mono NL" panose="02000009000000000000" pitchFamily="49" charset="0"/>
                 <a:cs typeface="JetBrains Mono NL" panose="02000009000000000000" pitchFamily="49" charset="0"/>
@@ -6852,7 +7158,7 @@
               <a:t>class</a:t>
             </a:r>
             <a:r>
-              <a:rPr lang="en-US" sz="2000" dirty="0">
+              <a:rPr lang="en-US" dirty="0">
                 <a:latin typeface="JetBrains Mono NL" panose="02000009000000000000" pitchFamily="49" charset="0"/>
                 <a:ea typeface="JetBrains Mono NL" panose="02000009000000000000" pitchFamily="49" charset="0"/>
                 <a:cs typeface="JetBrains Mono NL" panose="02000009000000000000" pitchFamily="49" charset="0"/>
@@ -6860,7 +7166,7 @@
               <a:t> </a:t>
             </a:r>
             <a:r>
-              <a:rPr lang="en-US" sz="2000" b="1" dirty="0" err="1">
+              <a:rPr lang="en-US" dirty="0" err="1">
                 <a:latin typeface="JetBrains Mono NL" panose="02000009000000000000" pitchFamily="49" charset="0"/>
                 <a:ea typeface="JetBrains Mono NL" panose="02000009000000000000" pitchFamily="49" charset="0"/>
                 <a:cs typeface="JetBrains Mono NL" panose="02000009000000000000" pitchFamily="49" charset="0"/>
@@ -6868,7 +7174,7 @@
               <a:t>EmployeesTest</a:t>
             </a:r>
             <a:r>
-              <a:rPr lang="en-US" sz="2000" dirty="0">
+              <a:rPr lang="en-US" dirty="0">
                 <a:latin typeface="JetBrains Mono NL" panose="02000009000000000000" pitchFamily="49" charset="0"/>
                 <a:ea typeface="JetBrains Mono NL" panose="02000009000000000000" pitchFamily="49" charset="0"/>
                 <a:cs typeface="JetBrains Mono NL" panose="02000009000000000000" pitchFamily="49" charset="0"/>
@@ -6881,7 +7187,7 @@
               <a:buNone/>
             </a:pPr>
             <a:r>
-              <a:rPr lang="en-US" sz="2000" dirty="0">
+              <a:rPr lang="en-US" dirty="0">
                 <a:latin typeface="JetBrains Mono NL" panose="02000009000000000000" pitchFamily="49" charset="0"/>
                 <a:ea typeface="JetBrains Mono NL" panose="02000009000000000000" pitchFamily="49" charset="0"/>
                 <a:cs typeface="JetBrains Mono NL" panose="02000009000000000000" pitchFamily="49" charset="0"/>
@@ -6894,7 +7200,7 @@
               <a:buNone/>
             </a:pPr>
             <a:r>
-              <a:rPr lang="en-US" sz="2000" dirty="0">
+              <a:rPr lang="en-US" dirty="0">
                 <a:latin typeface="JetBrains Mono NL" panose="02000009000000000000" pitchFamily="49" charset="0"/>
                 <a:ea typeface="JetBrains Mono NL" panose="02000009000000000000" pitchFamily="49" charset="0"/>
                 <a:cs typeface="JetBrains Mono NL" panose="02000009000000000000" pitchFamily="49" charset="0"/>
@@ -6957,7 +7263,7 @@
           <a:p>
             <a:r>
               <a:rPr lang="en-US" dirty="0">
-                <a:latin typeface="JetBrains Mono NL" panose="02000009000000000000" pitchFamily="49" charset="0"/>
+                <a:latin typeface="Courier" pitchFamily="2" charset="0"/>
                 <a:ea typeface="JetBrains Mono NL" panose="02000009000000000000" pitchFamily="49" charset="0"/>
                 <a:cs typeface="JetBrains Mono NL" panose="02000009000000000000" pitchFamily="49" charset="0"/>
               </a:rPr>
@@ -6996,80 +7302,110 @@
               <a:t>Test classes and methods can be tagged via the </a:t>
             </a:r>
             <a:r>
+              <a:rPr lang="en-US" b="1" dirty="0">
+                <a:latin typeface="Courier" pitchFamily="2" charset="0"/>
+                <a:ea typeface="JetBrains Mono NL" panose="02000009000000000000" pitchFamily="49" charset="0"/>
+                <a:cs typeface="JetBrains Mono NL" panose="02000009000000000000" pitchFamily="49" charset="0"/>
+              </a:rPr>
+              <a:t>@Tag</a:t>
+            </a:r>
+            <a:r>
+              <a:rPr lang="en-US" dirty="0"/>
+              <a:t> annotation.</a:t>
+            </a:r>
+          </a:p>
+          <a:p>
+            <a:r>
+              <a:rPr lang="en-US" dirty="0"/>
+              <a:t>Those tags can later be used to filter test discovery and execution. </a:t>
+            </a:r>
+          </a:p>
+          <a:p>
+            <a:pPr lvl="1"/>
+            <a:r>
+              <a:rPr lang="en-US" dirty="0"/>
+              <a:t>Great way to segregate unit tests from integration tests.</a:t>
+            </a:r>
+          </a:p>
+          <a:p>
+            <a:r>
+              <a:rPr lang="en-US" dirty="0"/>
+              <a:t>Create </a:t>
+            </a:r>
+            <a:r>
+              <a:rPr lang="en-US" i="1" dirty="0"/>
+              <a:t>custom composed annotations </a:t>
+            </a:r>
+            <a:r>
+              <a:rPr lang="en-US" dirty="0"/>
+              <a:t>for commonly used tags in your system. </a:t>
+            </a:r>
+          </a:p>
+          <a:p>
+            <a:pPr lvl="1"/>
+            <a:r>
+              <a:rPr lang="en-US" dirty="0"/>
+              <a:t>For example, create a custom composed annotation </a:t>
+            </a:r>
+            <a:r>
               <a:rPr lang="en-US" dirty="0">
-                <a:latin typeface="JetBrains Mono NL" panose="02000009000000000000" pitchFamily="49" charset="0"/>
-                <a:ea typeface="JetBrains Mono NL" panose="02000009000000000000" pitchFamily="49" charset="0"/>
-                <a:cs typeface="JetBrains Mono NL" panose="02000009000000000000" pitchFamily="49" charset="0"/>
-              </a:rPr>
-              <a:t>@Tag</a:t>
-            </a:r>
-            <a:r>
-              <a:rPr lang="en-US" dirty="0"/>
-              <a:t> annotation.</a:t>
-            </a:r>
-          </a:p>
-          <a:p>
-            <a:r>
-              <a:rPr lang="en-US" dirty="0"/>
-              <a:t>Those tags can later be used to filter test discovery and execution. </a:t>
+                <a:latin typeface="Courier" pitchFamily="2" charset="0"/>
+                <a:ea typeface="JetBrains Mono NL" panose="02000009000000000000" pitchFamily="49" charset="0"/>
+                <a:cs typeface="JetBrains Mono NL" panose="02000009000000000000" pitchFamily="49" charset="0"/>
+              </a:rPr>
+              <a:t>@</a:t>
+            </a:r>
+            <a:r>
+              <a:rPr lang="en-US" dirty="0" err="1">
+                <a:latin typeface="Courier" pitchFamily="2" charset="0"/>
+                <a:ea typeface="JetBrains Mono NL" panose="02000009000000000000" pitchFamily="49" charset="0"/>
+                <a:cs typeface="JetBrains Mono NL" panose="02000009000000000000" pitchFamily="49" charset="0"/>
+              </a:rPr>
+              <a:t>UnitTest</a:t>
+            </a:r>
+            <a:r>
+              <a:rPr lang="en-US" dirty="0"/>
+              <a:t>. It can then be used as a drop-in replacement for </a:t>
+            </a:r>
+            <a:r>
+              <a:rPr lang="en-US" dirty="0">
+                <a:latin typeface="Courier" pitchFamily="2" charset="0"/>
+                <a:ea typeface="JetBrains Mono NL" panose="02000009000000000000" pitchFamily="49" charset="0"/>
+                <a:cs typeface="JetBrains Mono NL" panose="02000009000000000000" pitchFamily="49" charset="0"/>
+              </a:rPr>
+              <a:t>@Tag("unit")</a:t>
+            </a:r>
+            <a:r>
+              <a:rPr lang="en-US" dirty="0"/>
+              <a:t>.</a:t>
             </a:r>
           </a:p>
           <a:p>
             <a:pPr lvl="1"/>
             <a:r>
               <a:rPr lang="en-US" dirty="0"/>
-              <a:t>Great way to segregate unit tests from integration tests.</a:t>
-            </a:r>
-          </a:p>
-          <a:p>
-            <a:r>
-              <a:rPr lang="en-US" dirty="0"/>
-              <a:t>Create custom composed annotations for commonly used tags in your system. </a:t>
+              <a:t>String does not allow spaces. Use </a:t>
+            </a:r>
+            <a:r>
+              <a:rPr lang="en-US" dirty="0" err="1"/>
+              <a:t>camelCasing</a:t>
+            </a:r>
+            <a:r>
+              <a:rPr lang="en-US" dirty="0"/>
+              <a:t>.</a:t>
+            </a:r>
+          </a:p>
+          <a:p>
+            <a:r>
+              <a:rPr lang="en-US" dirty="0"/>
+              <a:t>Filter test execution with tags </a:t>
             </a:r>
           </a:p>
           <a:p>
             <a:pPr lvl="1"/>
             <a:r>
               <a:rPr lang="en-US" dirty="0"/>
-              <a:t>For example, create a custom composed annotation </a:t>
-            </a:r>
-            <a:r>
-              <a:rPr lang="en-US" dirty="0">
-                <a:latin typeface="JetBrains Mono NL" panose="02000009000000000000" pitchFamily="49" charset="0"/>
-                <a:ea typeface="JetBrains Mono NL" panose="02000009000000000000" pitchFamily="49" charset="0"/>
-                <a:cs typeface="JetBrains Mono NL" panose="02000009000000000000" pitchFamily="49" charset="0"/>
-              </a:rPr>
-              <a:t>@</a:t>
-            </a:r>
-            <a:r>
-              <a:rPr lang="en-US" dirty="0" err="1">
-                <a:latin typeface="JetBrains Mono NL" panose="02000009000000000000" pitchFamily="49" charset="0"/>
-                <a:ea typeface="JetBrains Mono NL" panose="02000009000000000000" pitchFamily="49" charset="0"/>
-                <a:cs typeface="JetBrains Mono NL" panose="02000009000000000000" pitchFamily="49" charset="0"/>
-              </a:rPr>
-              <a:t>UnitTest</a:t>
-            </a:r>
-            <a:r>
-              <a:rPr lang="en-US" dirty="0"/>
-              <a:t>. It can then be used as a drop-in replacement for </a:t>
-            </a:r>
-            <a:r>
-              <a:rPr lang="en-US" dirty="0">
-                <a:latin typeface="JetBrains Mono NL" panose="02000009000000000000" pitchFamily="49" charset="0"/>
-                <a:ea typeface="JetBrains Mono NL" panose="02000009000000000000" pitchFamily="49" charset="0"/>
-                <a:cs typeface="JetBrains Mono NL" panose="02000009000000000000" pitchFamily="49" charset="0"/>
-              </a:rPr>
-              <a:t>@Tag(”unit")</a:t>
-            </a:r>
-            <a:r>
-              <a:rPr lang="en-US" dirty="0"/>
-              <a:t>.’</a:t>
-            </a:r>
-          </a:p>
-          <a:p>
-            <a:r>
-              <a:rPr lang="en-US" dirty="0"/>
-              <a:t>Filtering test execution with tags is supported in IDEs and build tools (Maven, Gradle).</a:t>
+              <a:t>Supported by IDEs and build tools (Maven, Gradle).</a:t>
             </a:r>
           </a:p>
         </p:txBody>

</xml_diff>